<commit_message>
new global fitting analysis
</commit_message>
<xml_diff>
--- a/poster/sjoerd theory.pptx
+++ b/poster/sjoerd theory.pptx
@@ -7,6 +7,8 @@
   <p:sldIdLst>
     <p:sldId id="256" r:id="rId2"/>
     <p:sldId id="257" r:id="rId3"/>
+    <p:sldId id="258" r:id="rId4"/>
+    <p:sldId id="259" r:id="rId5"/>
   </p:sldIdLst>
   <p:sldSz cx="12192000" cy="6858000"/>
   <p:notesSz cx="6858000" cy="9144000"/>
@@ -105,6 +107,11 @@
       </a:defRPr>
     </a:lvl9pPr>
   </p:defaultTextStyle>
+  <p:extLst>
+    <p:ext uri="{EFAFB233-063F-42B5-8137-9DF3F51BA10A}">
+      <p15:sldGuideLst xmlns:p15="http://schemas.microsoft.com/office/powerpoint/2012/main"/>
+    </p:ext>
+  </p:extLst>
 </p:presentation>
 </file>
 
@@ -255,7 +262,7 @@
           <a:p>
             <a:fld id="{F48B3F8A-F669-460C-979B-78733FAE83D7}" type="datetimeFigureOut">
               <a:rPr lang="nl-NL" smtClean="0"/>
-              <a:t>21-4-2018</a:t>
+              <a:t>22-4-2018</a:t>
             </a:fld>
             <a:endParaRPr lang="nl-NL"/>
           </a:p>
@@ -453,7 +460,7 @@
           <a:p>
             <a:fld id="{F48B3F8A-F669-460C-979B-78733FAE83D7}" type="datetimeFigureOut">
               <a:rPr lang="nl-NL" smtClean="0"/>
-              <a:t>21-4-2018</a:t>
+              <a:t>22-4-2018</a:t>
             </a:fld>
             <a:endParaRPr lang="nl-NL"/>
           </a:p>
@@ -661,7 +668,7 @@
           <a:p>
             <a:fld id="{F48B3F8A-F669-460C-979B-78733FAE83D7}" type="datetimeFigureOut">
               <a:rPr lang="nl-NL" smtClean="0"/>
-              <a:t>21-4-2018</a:t>
+              <a:t>22-4-2018</a:t>
             </a:fld>
             <a:endParaRPr lang="nl-NL"/>
           </a:p>
@@ -859,7 +866,7 @@
           <a:p>
             <a:fld id="{F48B3F8A-F669-460C-979B-78733FAE83D7}" type="datetimeFigureOut">
               <a:rPr lang="nl-NL" smtClean="0"/>
-              <a:t>21-4-2018</a:t>
+              <a:t>22-4-2018</a:t>
             </a:fld>
             <a:endParaRPr lang="nl-NL"/>
           </a:p>
@@ -1134,7 +1141,7 @@
           <a:p>
             <a:fld id="{F48B3F8A-F669-460C-979B-78733FAE83D7}" type="datetimeFigureOut">
               <a:rPr lang="nl-NL" smtClean="0"/>
-              <a:t>21-4-2018</a:t>
+              <a:t>22-4-2018</a:t>
             </a:fld>
             <a:endParaRPr lang="nl-NL"/>
           </a:p>
@@ -1399,7 +1406,7 @@
           <a:p>
             <a:fld id="{F48B3F8A-F669-460C-979B-78733FAE83D7}" type="datetimeFigureOut">
               <a:rPr lang="nl-NL" smtClean="0"/>
-              <a:t>21-4-2018</a:t>
+              <a:t>22-4-2018</a:t>
             </a:fld>
             <a:endParaRPr lang="nl-NL"/>
           </a:p>
@@ -1811,7 +1818,7 @@
           <a:p>
             <a:fld id="{F48B3F8A-F669-460C-979B-78733FAE83D7}" type="datetimeFigureOut">
               <a:rPr lang="nl-NL" smtClean="0"/>
-              <a:t>21-4-2018</a:t>
+              <a:t>22-4-2018</a:t>
             </a:fld>
             <a:endParaRPr lang="nl-NL"/>
           </a:p>
@@ -1952,7 +1959,7 @@
           <a:p>
             <a:fld id="{F48B3F8A-F669-460C-979B-78733FAE83D7}" type="datetimeFigureOut">
               <a:rPr lang="nl-NL" smtClean="0"/>
-              <a:t>21-4-2018</a:t>
+              <a:t>22-4-2018</a:t>
             </a:fld>
             <a:endParaRPr lang="nl-NL"/>
           </a:p>
@@ -2065,7 +2072,7 @@
           <a:p>
             <a:fld id="{F48B3F8A-F669-460C-979B-78733FAE83D7}" type="datetimeFigureOut">
               <a:rPr lang="nl-NL" smtClean="0"/>
-              <a:t>21-4-2018</a:t>
+              <a:t>22-4-2018</a:t>
             </a:fld>
             <a:endParaRPr lang="nl-NL"/>
           </a:p>
@@ -2376,7 +2383,7 @@
           <a:p>
             <a:fld id="{F48B3F8A-F669-460C-979B-78733FAE83D7}" type="datetimeFigureOut">
               <a:rPr lang="nl-NL" smtClean="0"/>
-              <a:t>21-4-2018</a:t>
+              <a:t>22-4-2018</a:t>
             </a:fld>
             <a:endParaRPr lang="nl-NL"/>
           </a:p>
@@ -2664,7 +2671,7 @@
           <a:p>
             <a:fld id="{F48B3F8A-F669-460C-979B-78733FAE83D7}" type="datetimeFigureOut">
               <a:rPr lang="nl-NL" smtClean="0"/>
-              <a:t>21-4-2018</a:t>
+              <a:t>22-4-2018</a:t>
             </a:fld>
             <a:endParaRPr lang="nl-NL"/>
           </a:p>
@@ -2905,7 +2912,7 @@
           <a:p>
             <a:fld id="{F48B3F8A-F669-460C-979B-78733FAE83D7}" type="datetimeFigureOut">
               <a:rPr lang="nl-NL" smtClean="0"/>
-              <a:t>21-4-2018</a:t>
+              <a:t>22-4-2018</a:t>
             </a:fld>
             <a:endParaRPr lang="nl-NL"/>
           </a:p>
@@ -3322,8 +3329,8 @@
           <a:chExt cx="0" cy="0"/>
         </a:xfrm>
       </p:grpSpPr>
-      <mc:AlternateContent xmlns:mc="http://schemas.openxmlformats.org/markup-compatibility/2006">
-        <mc:Choice xmlns:a14="http://schemas.microsoft.com/office/drawing/2010/main" Requires="a14">
+      <mc:AlternateContent xmlns:mc="http://schemas.openxmlformats.org/markup-compatibility/2006" xmlns:a14="http://schemas.microsoft.com/office/drawing/2010/main">
+        <mc:Choice Requires="a14">
           <p:sp>
             <p:nvSpPr>
               <p:cNvPr id="4" name="Tekstvak 3">
@@ -3649,21 +3656,7 @@
                         <a:latin typeface="Cambria Math" panose="02040503050406030204" pitchFamily="18" charset="0"/>
                         <a:ea typeface="Cambria Math" panose="02040503050406030204" pitchFamily="18" charset="0"/>
                       </a:rPr>
-                      <m:t>(</m:t>
-                    </m:r>
-                    <m:r>
-                      <a:rPr lang="nl-NL" sz="1400" b="0" i="1" smtClean="0">
-                        <a:latin typeface="Cambria Math" panose="02040503050406030204" pitchFamily="18" charset="0"/>
-                        <a:ea typeface="Cambria Math" panose="02040503050406030204" pitchFamily="18" charset="0"/>
-                      </a:rPr>
-                      <m:t>0</m:t>
-                    </m:r>
-                    <m:r>
-                      <a:rPr lang="nl-NL" sz="1400" b="0" i="1" smtClean="0">
-                        <a:latin typeface="Cambria Math" panose="02040503050406030204" pitchFamily="18" charset="0"/>
-                        <a:ea typeface="Cambria Math" panose="02040503050406030204" pitchFamily="18" charset="0"/>
-                      </a:rPr>
-                      <m:t>)</m:t>
+                      <m:t>(0)</m:t>
                     </m:r>
                   </m:oMath>
                 </a14:m>
@@ -3759,21 +3752,7 @@
                         <a:latin typeface="Cambria Math" panose="02040503050406030204" pitchFamily="18" charset="0"/>
                         <a:ea typeface="Cambria Math" panose="02040503050406030204" pitchFamily="18" charset="0"/>
                       </a:rPr>
-                      <m:t>(</m:t>
-                    </m:r>
-                    <m:r>
-                      <a:rPr lang="nl-NL" sz="1400" b="0" i="1" smtClean="0">
-                        <a:latin typeface="Cambria Math" panose="02040503050406030204" pitchFamily="18" charset="0"/>
-                        <a:ea typeface="Cambria Math" panose="02040503050406030204" pitchFamily="18" charset="0"/>
-                      </a:rPr>
-                      <m:t>∞</m:t>
-                    </m:r>
-                    <m:r>
-                      <a:rPr lang="nl-NL" sz="1400" b="0" i="1" smtClean="0">
-                        <a:latin typeface="Cambria Math" panose="02040503050406030204" pitchFamily="18" charset="0"/>
-                        <a:ea typeface="Cambria Math" panose="02040503050406030204" pitchFamily="18" charset="0"/>
-                      </a:rPr>
-                      <m:t>)</m:t>
+                      <m:t>(∞)</m:t>
                     </m:r>
                   </m:oMath>
                 </a14:m>
@@ -4278,7 +4257,7 @@
             </p:txBody>
           </p:sp>
         </mc:Choice>
-        <mc:Fallback>
+        <mc:Fallback xmlns="">
           <p:sp>
             <p:nvSpPr>
               <p:cNvPr id="4" name="Tekstvak 3">
@@ -5157,10 +5136,2271 @@
           </p:grpSp>
         </p:grpSp>
       </p:grpSp>
+      <p:sp>
+        <p:nvSpPr>
+          <p:cNvPr id="2" name="Tekstvak 1">
+            <a:extLst>
+              <a:ext uri="{FF2B5EF4-FFF2-40B4-BE49-F238E27FC236}">
+                <a16:creationId xmlns:a16="http://schemas.microsoft.com/office/drawing/2014/main" id="{FE789F14-879B-4F3F-8826-05866DE4366D}"/>
+              </a:ext>
+            </a:extLst>
+          </p:cNvPr>
+          <p:cNvSpPr txBox="1"/>
+          <p:nvPr/>
+        </p:nvSpPr>
+        <p:spPr>
+          <a:xfrm>
+            <a:off x="5710687" y="1000664"/>
+            <a:ext cx="1306704" cy="369332"/>
+          </a:xfrm>
+          <a:prstGeom prst="rect">
+            <a:avLst/>
+          </a:prstGeom>
+          <a:noFill/>
+        </p:spPr>
+        <p:txBody>
+          <a:bodyPr wrap="none" rtlCol="0">
+            <a:spAutoFit/>
+          </a:bodyPr>
+          <a:lstStyle/>
+          <a:p>
+            <a:r>
+              <a:rPr lang="nl-NL" dirty="0"/>
+              <a:t>Oude fitting</a:t>
+            </a:r>
+          </a:p>
+        </p:txBody>
+      </p:sp>
     </p:spTree>
     <p:extLst>
       <p:ext uri="{BB962C8B-B14F-4D97-AF65-F5344CB8AC3E}">
         <p14:creationId xmlns:p14="http://schemas.microsoft.com/office/powerpoint/2010/main" val="2717047317"/>
+      </p:ext>
+    </p:extLst>
+  </p:cSld>
+  <p:clrMapOvr>
+    <a:masterClrMapping/>
+  </p:clrMapOvr>
+</p:sld>
+</file>
+
+<file path=ppt/slides/slide3.xml><?xml version="1.0" encoding="utf-8"?>
+<p:sld xmlns:a="http://schemas.openxmlformats.org/drawingml/2006/main" xmlns:r="http://schemas.openxmlformats.org/officeDocument/2006/relationships" xmlns:p="http://schemas.openxmlformats.org/presentationml/2006/main">
+  <p:cSld>
+    <p:spTree>
+      <p:nvGrpSpPr>
+        <p:cNvPr id="1" name=""/>
+        <p:cNvGrpSpPr/>
+        <p:nvPr/>
+      </p:nvGrpSpPr>
+      <p:grpSpPr>
+        <a:xfrm>
+          <a:off x="0" y="0"/>
+          <a:ext cx="0" cy="0"/>
+          <a:chOff x="0" y="0"/>
+          <a:chExt cx="0" cy="0"/>
+        </a:xfrm>
+      </p:grpSpPr>
+      <p:grpSp>
+        <p:nvGrpSpPr>
+          <p:cNvPr id="18" name="Groep 17">
+            <a:extLst>
+              <a:ext uri="{FF2B5EF4-FFF2-40B4-BE49-F238E27FC236}">
+                <a16:creationId xmlns:a16="http://schemas.microsoft.com/office/drawing/2014/main" id="{102F5D75-0CDD-47CB-A1A0-C76A30E7E6AA}"/>
+              </a:ext>
+            </a:extLst>
+          </p:cNvPr>
+          <p:cNvGrpSpPr/>
+          <p:nvPr/>
+        </p:nvGrpSpPr>
+        <p:grpSpPr>
+          <a:xfrm>
+            <a:off x="2370926" y="1306519"/>
+            <a:ext cx="7291358" cy="3947887"/>
+            <a:chOff x="2215650" y="1806852"/>
+            <a:chExt cx="7291358" cy="3947887"/>
+          </a:xfrm>
+        </p:grpSpPr>
+        <p:grpSp>
+          <p:nvGrpSpPr>
+            <p:cNvPr id="5" name="Groep 4">
+              <a:extLst>
+                <a:ext uri="{FF2B5EF4-FFF2-40B4-BE49-F238E27FC236}">
+                  <a16:creationId xmlns:a16="http://schemas.microsoft.com/office/drawing/2014/main" id="{E68115EC-FC05-40B9-9016-5E7133ADCAC6}"/>
+                </a:ext>
+              </a:extLst>
+            </p:cNvPr>
+            <p:cNvGrpSpPr/>
+            <p:nvPr/>
+          </p:nvGrpSpPr>
+          <p:grpSpPr>
+            <a:xfrm>
+              <a:off x="2684993" y="1806852"/>
+              <a:ext cx="6822015" cy="3244297"/>
+              <a:chOff x="3494617" y="250140"/>
+              <a:chExt cx="6822015" cy="3244297"/>
+            </a:xfrm>
+          </p:grpSpPr>
+          <p:pic>
+            <p:nvPicPr>
+              <p:cNvPr id="2" name="Afbeelding 1">
+                <a:extLst>
+                  <a:ext uri="{FF2B5EF4-FFF2-40B4-BE49-F238E27FC236}">
+                    <a16:creationId xmlns:a16="http://schemas.microsoft.com/office/drawing/2014/main" id="{E8543170-5095-41CF-A93F-B214CD2C8A31}"/>
+                  </a:ext>
+                </a:extLst>
+              </p:cNvPr>
+              <p:cNvPicPr>
+                <a:picLocks noChangeAspect="1"/>
+              </p:cNvPicPr>
+              <p:nvPr/>
+            </p:nvPicPr>
+            <p:blipFill rotWithShape="1">
+              <a:blip r:embed="rId2"/>
+              <a:srcRect b="29990"/>
+              <a:stretch/>
+            </p:blipFill>
+            <p:spPr>
+              <a:xfrm>
+                <a:off x="3494617" y="250140"/>
+                <a:ext cx="6822015" cy="2863996"/>
+              </a:xfrm>
+              <a:prstGeom prst="rect">
+                <a:avLst/>
+              </a:prstGeom>
+            </p:spPr>
+          </p:pic>
+          <p:sp>
+            <p:nvSpPr>
+              <p:cNvPr id="3" name="Tekstvak 2">
+                <a:extLst>
+                  <a:ext uri="{FF2B5EF4-FFF2-40B4-BE49-F238E27FC236}">
+                    <a16:creationId xmlns:a16="http://schemas.microsoft.com/office/drawing/2014/main" id="{C704E5CB-715E-4719-971A-68906C6DDEDF}"/>
+                  </a:ext>
+                </a:extLst>
+              </p:cNvPr>
+              <p:cNvSpPr txBox="1"/>
+              <p:nvPr/>
+            </p:nvSpPr>
+            <p:spPr>
+              <a:xfrm>
+                <a:off x="3905806" y="3155883"/>
+                <a:ext cx="470000" cy="338554"/>
+              </a:xfrm>
+              <a:prstGeom prst="rect">
+                <a:avLst/>
+              </a:prstGeom>
+              <a:noFill/>
+            </p:spPr>
+            <p:txBody>
+              <a:bodyPr wrap="none" rtlCol="0">
+                <a:spAutoFit/>
+              </a:bodyPr>
+              <a:lstStyle/>
+              <a:p>
+                <a:r>
+                  <a:rPr lang="nl-NL" sz="1600" dirty="0">
+                    <a:latin typeface="Arial" panose="020B0604020202020204" pitchFamily="34" charset="0"/>
+                    <a:cs typeface="Arial" panose="020B0604020202020204" pitchFamily="34" charset="0"/>
+                  </a:rPr>
+                  <a:t>0.1</a:t>
+                </a:r>
+              </a:p>
+            </p:txBody>
+          </p:sp>
+          <p:sp>
+            <p:nvSpPr>
+              <p:cNvPr id="28" name="Tekstvak 27">
+                <a:extLst>
+                  <a:ext uri="{FF2B5EF4-FFF2-40B4-BE49-F238E27FC236}">
+                    <a16:creationId xmlns:a16="http://schemas.microsoft.com/office/drawing/2014/main" id="{4FC238E7-00E4-48E7-BB5A-11BA822ACF84}"/>
+                  </a:ext>
+                </a:extLst>
+              </p:cNvPr>
+              <p:cNvSpPr txBox="1"/>
+              <p:nvPr/>
+            </p:nvSpPr>
+            <p:spPr>
+              <a:xfrm>
+                <a:off x="4838768" y="3155883"/>
+                <a:ext cx="298480" cy="338554"/>
+              </a:xfrm>
+              <a:prstGeom prst="rect">
+                <a:avLst/>
+              </a:prstGeom>
+              <a:noFill/>
+            </p:spPr>
+            <p:txBody>
+              <a:bodyPr wrap="none" rtlCol="0">
+                <a:spAutoFit/>
+              </a:bodyPr>
+              <a:lstStyle/>
+              <a:p>
+                <a:r>
+                  <a:rPr lang="nl-NL" sz="1600" dirty="0">
+                    <a:latin typeface="Arial" panose="020B0604020202020204" pitchFamily="34" charset="0"/>
+                    <a:cs typeface="Arial" panose="020B0604020202020204" pitchFamily="34" charset="0"/>
+                  </a:rPr>
+                  <a:t>1</a:t>
+                </a:r>
+                <a:endParaRPr lang="nl-NL" sz="1600" baseline="30000" dirty="0">
+                  <a:latin typeface="Arial" panose="020B0604020202020204" pitchFamily="34" charset="0"/>
+                  <a:cs typeface="Arial" panose="020B0604020202020204" pitchFamily="34" charset="0"/>
+                </a:endParaRPr>
+              </a:p>
+            </p:txBody>
+          </p:sp>
+          <p:sp>
+            <p:nvSpPr>
+              <p:cNvPr id="29" name="Tekstvak 28">
+                <a:extLst>
+                  <a:ext uri="{FF2B5EF4-FFF2-40B4-BE49-F238E27FC236}">
+                    <a16:creationId xmlns:a16="http://schemas.microsoft.com/office/drawing/2014/main" id="{1DCD742D-3F68-46C3-9D52-F5DB2F80EEE0}"/>
+                  </a:ext>
+                </a:extLst>
+              </p:cNvPr>
+              <p:cNvSpPr txBox="1"/>
+              <p:nvPr/>
+            </p:nvSpPr>
+            <p:spPr>
+              <a:xfrm>
+                <a:off x="5611522" y="3155883"/>
+                <a:ext cx="412292" cy="338554"/>
+              </a:xfrm>
+              <a:prstGeom prst="rect">
+                <a:avLst/>
+              </a:prstGeom>
+              <a:noFill/>
+            </p:spPr>
+            <p:txBody>
+              <a:bodyPr wrap="none" rtlCol="0">
+                <a:spAutoFit/>
+              </a:bodyPr>
+              <a:lstStyle/>
+              <a:p>
+                <a:r>
+                  <a:rPr lang="nl-NL" sz="1600" dirty="0">
+                    <a:latin typeface="Arial" panose="020B0604020202020204" pitchFamily="34" charset="0"/>
+                    <a:cs typeface="Arial" panose="020B0604020202020204" pitchFamily="34" charset="0"/>
+                  </a:rPr>
+                  <a:t>10</a:t>
+                </a:r>
+                <a:endParaRPr lang="nl-NL" sz="1600" baseline="30000" dirty="0">
+                  <a:latin typeface="Arial" panose="020B0604020202020204" pitchFamily="34" charset="0"/>
+                  <a:cs typeface="Arial" panose="020B0604020202020204" pitchFamily="34" charset="0"/>
+                </a:endParaRPr>
+              </a:p>
+            </p:txBody>
+          </p:sp>
+          <p:sp>
+            <p:nvSpPr>
+              <p:cNvPr id="31" name="Tekstvak 30">
+                <a:extLst>
+                  <a:ext uri="{FF2B5EF4-FFF2-40B4-BE49-F238E27FC236}">
+                    <a16:creationId xmlns:a16="http://schemas.microsoft.com/office/drawing/2014/main" id="{0E809666-D165-4557-BC1D-AA0CE9C33695}"/>
+                  </a:ext>
+                </a:extLst>
+              </p:cNvPr>
+              <p:cNvSpPr txBox="1"/>
+              <p:nvPr/>
+            </p:nvSpPr>
+            <p:spPr>
+              <a:xfrm>
+                <a:off x="6404434" y="3154290"/>
+                <a:ext cx="487634" cy="338554"/>
+              </a:xfrm>
+              <a:prstGeom prst="rect">
+                <a:avLst/>
+              </a:prstGeom>
+              <a:noFill/>
+            </p:spPr>
+            <p:txBody>
+              <a:bodyPr wrap="none" rtlCol="0">
+                <a:spAutoFit/>
+              </a:bodyPr>
+              <a:lstStyle/>
+              <a:p>
+                <a:r>
+                  <a:rPr lang="nl-NL" sz="1600" dirty="0">
+                    <a:latin typeface="Arial" panose="020B0604020202020204" pitchFamily="34" charset="0"/>
+                    <a:cs typeface="Arial" panose="020B0604020202020204" pitchFamily="34" charset="0"/>
+                  </a:rPr>
+                  <a:t>10</a:t>
+                </a:r>
+                <a:r>
+                  <a:rPr lang="nl-NL" sz="1600" baseline="30000" dirty="0">
+                    <a:latin typeface="Arial" panose="020B0604020202020204" pitchFamily="34" charset="0"/>
+                    <a:cs typeface="Arial" panose="020B0604020202020204" pitchFamily="34" charset="0"/>
+                  </a:rPr>
+                  <a:t>2</a:t>
+                </a:r>
+              </a:p>
+            </p:txBody>
+          </p:sp>
+          <p:sp>
+            <p:nvSpPr>
+              <p:cNvPr id="32" name="Tekstvak 31">
+                <a:extLst>
+                  <a:ext uri="{FF2B5EF4-FFF2-40B4-BE49-F238E27FC236}">
+                    <a16:creationId xmlns:a16="http://schemas.microsoft.com/office/drawing/2014/main" id="{96543CB5-9F27-48E8-A6DF-75868B1E4B22}"/>
+                  </a:ext>
+                </a:extLst>
+              </p:cNvPr>
+              <p:cNvSpPr txBox="1"/>
+              <p:nvPr/>
+            </p:nvSpPr>
+            <p:spPr>
+              <a:xfrm>
+                <a:off x="7247456" y="3154290"/>
+                <a:ext cx="487634" cy="338554"/>
+              </a:xfrm>
+              <a:prstGeom prst="rect">
+                <a:avLst/>
+              </a:prstGeom>
+              <a:noFill/>
+            </p:spPr>
+            <p:txBody>
+              <a:bodyPr wrap="none" rtlCol="0">
+                <a:spAutoFit/>
+              </a:bodyPr>
+              <a:lstStyle/>
+              <a:p>
+                <a:r>
+                  <a:rPr lang="nl-NL" sz="1600" dirty="0">
+                    <a:latin typeface="Arial" panose="020B0604020202020204" pitchFamily="34" charset="0"/>
+                    <a:cs typeface="Arial" panose="020B0604020202020204" pitchFamily="34" charset="0"/>
+                  </a:rPr>
+                  <a:t>10</a:t>
+                </a:r>
+                <a:r>
+                  <a:rPr lang="nl-NL" sz="1600" baseline="30000" dirty="0">
+                    <a:latin typeface="Arial" panose="020B0604020202020204" pitchFamily="34" charset="0"/>
+                    <a:cs typeface="Arial" panose="020B0604020202020204" pitchFamily="34" charset="0"/>
+                  </a:rPr>
+                  <a:t>3</a:t>
+                </a:r>
+              </a:p>
+            </p:txBody>
+          </p:sp>
+          <p:sp>
+            <p:nvSpPr>
+              <p:cNvPr id="33" name="Tekstvak 32">
+                <a:extLst>
+                  <a:ext uri="{FF2B5EF4-FFF2-40B4-BE49-F238E27FC236}">
+                    <a16:creationId xmlns:a16="http://schemas.microsoft.com/office/drawing/2014/main" id="{15AB013D-6654-454E-8F88-B26C4D6F2CED}"/>
+                  </a:ext>
+                </a:extLst>
+              </p:cNvPr>
+              <p:cNvSpPr txBox="1"/>
+              <p:nvPr/>
+            </p:nvSpPr>
+            <p:spPr>
+              <a:xfrm>
+                <a:off x="8090478" y="3154290"/>
+                <a:ext cx="487634" cy="338554"/>
+              </a:xfrm>
+              <a:prstGeom prst="rect">
+                <a:avLst/>
+              </a:prstGeom>
+              <a:noFill/>
+            </p:spPr>
+            <p:txBody>
+              <a:bodyPr wrap="none" rtlCol="0">
+                <a:spAutoFit/>
+              </a:bodyPr>
+              <a:lstStyle/>
+              <a:p>
+                <a:r>
+                  <a:rPr lang="nl-NL" sz="1600" dirty="0">
+                    <a:latin typeface="Arial" panose="020B0604020202020204" pitchFamily="34" charset="0"/>
+                    <a:cs typeface="Arial" panose="020B0604020202020204" pitchFamily="34" charset="0"/>
+                  </a:rPr>
+                  <a:t>10</a:t>
+                </a:r>
+                <a:r>
+                  <a:rPr lang="nl-NL" sz="1600" baseline="30000" dirty="0">
+                    <a:latin typeface="Arial" panose="020B0604020202020204" pitchFamily="34" charset="0"/>
+                    <a:cs typeface="Arial" panose="020B0604020202020204" pitchFamily="34" charset="0"/>
+                  </a:rPr>
+                  <a:t>4</a:t>
+                </a:r>
+              </a:p>
+            </p:txBody>
+          </p:sp>
+          <p:sp>
+            <p:nvSpPr>
+              <p:cNvPr id="34" name="Tekstvak 33">
+                <a:extLst>
+                  <a:ext uri="{FF2B5EF4-FFF2-40B4-BE49-F238E27FC236}">
+                    <a16:creationId xmlns:a16="http://schemas.microsoft.com/office/drawing/2014/main" id="{613F4660-DBC9-468B-969D-720C8817FDA1}"/>
+                  </a:ext>
+                </a:extLst>
+              </p:cNvPr>
+              <p:cNvSpPr txBox="1"/>
+              <p:nvPr/>
+            </p:nvSpPr>
+            <p:spPr>
+              <a:xfrm>
+                <a:off x="8834566" y="3155307"/>
+                <a:ext cx="487634" cy="338554"/>
+              </a:xfrm>
+              <a:prstGeom prst="rect">
+                <a:avLst/>
+              </a:prstGeom>
+              <a:noFill/>
+            </p:spPr>
+            <p:txBody>
+              <a:bodyPr wrap="none" rtlCol="0">
+                <a:spAutoFit/>
+              </a:bodyPr>
+              <a:lstStyle/>
+              <a:p>
+                <a:r>
+                  <a:rPr lang="nl-NL" sz="1600" dirty="0">
+                    <a:latin typeface="Arial" panose="020B0604020202020204" pitchFamily="34" charset="0"/>
+                    <a:cs typeface="Arial" panose="020B0604020202020204" pitchFamily="34" charset="0"/>
+                  </a:rPr>
+                  <a:t>10</a:t>
+                </a:r>
+                <a:r>
+                  <a:rPr lang="nl-NL" sz="1600" baseline="30000" dirty="0">
+                    <a:latin typeface="Arial" panose="020B0604020202020204" pitchFamily="34" charset="0"/>
+                    <a:cs typeface="Arial" panose="020B0604020202020204" pitchFamily="34" charset="0"/>
+                  </a:rPr>
+                  <a:t>5</a:t>
+                </a:r>
+              </a:p>
+            </p:txBody>
+          </p:sp>
+          <p:sp>
+            <p:nvSpPr>
+              <p:cNvPr id="35" name="Tekstvak 34">
+                <a:extLst>
+                  <a:ext uri="{FF2B5EF4-FFF2-40B4-BE49-F238E27FC236}">
+                    <a16:creationId xmlns:a16="http://schemas.microsoft.com/office/drawing/2014/main" id="{0F5BD60B-1D93-4C57-817E-3E4DD6F13C7D}"/>
+                  </a:ext>
+                </a:extLst>
+              </p:cNvPr>
+              <p:cNvSpPr txBox="1"/>
+              <p:nvPr/>
+            </p:nvSpPr>
+            <p:spPr>
+              <a:xfrm>
+                <a:off x="9677588" y="3154290"/>
+                <a:ext cx="487634" cy="338554"/>
+              </a:xfrm>
+              <a:prstGeom prst="rect">
+                <a:avLst/>
+              </a:prstGeom>
+              <a:noFill/>
+            </p:spPr>
+            <p:txBody>
+              <a:bodyPr wrap="none" rtlCol="0">
+                <a:spAutoFit/>
+              </a:bodyPr>
+              <a:lstStyle/>
+              <a:p>
+                <a:r>
+                  <a:rPr lang="nl-NL" sz="1600" dirty="0">
+                    <a:latin typeface="Arial" panose="020B0604020202020204" pitchFamily="34" charset="0"/>
+                    <a:cs typeface="Arial" panose="020B0604020202020204" pitchFamily="34" charset="0"/>
+                  </a:rPr>
+                  <a:t>10</a:t>
+                </a:r>
+                <a:r>
+                  <a:rPr lang="nl-NL" sz="1600" baseline="30000" dirty="0">
+                    <a:latin typeface="Arial" panose="020B0604020202020204" pitchFamily="34" charset="0"/>
+                    <a:cs typeface="Arial" panose="020B0604020202020204" pitchFamily="34" charset="0"/>
+                  </a:rPr>
+                  <a:t>6</a:t>
+                </a:r>
+              </a:p>
+            </p:txBody>
+          </p:sp>
+        </p:grpSp>
+        <p:pic>
+          <p:nvPicPr>
+            <p:cNvPr id="6" name="Afbeelding 5" descr="https://latex.codecogs.com/gif.latex?%5Cdpi%7B300%7D%20%5CLARGE%20%5Cfrac%7B%5Cgamma%280%29%20-%20%5Cgamma%28t%29%7D%7B%5Cgamma%280%29%20-%20%5Cgamma%28%5Cinfty%29%7D">
+              <a:extLst>
+                <a:ext uri="{FF2B5EF4-FFF2-40B4-BE49-F238E27FC236}">
+                  <a16:creationId xmlns:a16="http://schemas.microsoft.com/office/drawing/2014/main" id="{C542E4BB-9865-4F90-AE32-00D106D8C997}"/>
+                </a:ext>
+              </a:extLst>
+            </p:cNvPr>
+            <p:cNvPicPr>
+              <a:picLocks noChangeAspect="1" noChangeArrowheads="1"/>
+            </p:cNvPicPr>
+            <p:nvPr/>
+          </p:nvPicPr>
+          <p:blipFill>
+            <a:blip r:embed="rId3" cstate="print">
+              <a:extLst>
+                <a:ext uri="{28A0092B-C50C-407E-A947-70E740481C1C}">
+                  <a14:useLocalDpi xmlns:a14="http://schemas.microsoft.com/office/drawing/2010/main" val="0"/>
+                </a:ext>
+              </a:extLst>
+            </a:blip>
+            <a:srcRect/>
+            <a:stretch>
+              <a:fillRect/>
+            </a:stretch>
+          </p:blipFill>
+          <p:spPr bwMode="auto">
+            <a:xfrm rot="16200000">
+              <a:off x="1928720" y="3004179"/>
+              <a:ext cx="1043202" cy="469342"/>
+            </a:xfrm>
+            <a:prstGeom prst="rect">
+              <a:avLst/>
+            </a:prstGeom>
+            <a:noFill/>
+            <a:extLst>
+              <a:ext uri="{909E8E84-426E-40DD-AFC4-6F175D3DCCD1}">
+                <a14:hiddenFill xmlns:a14="http://schemas.microsoft.com/office/drawing/2010/main">
+                  <a:solidFill>
+                    <a:srgbClr val="FFFFFF"/>
+                  </a:solidFill>
+                </a14:hiddenFill>
+              </a:ext>
+            </a:extLst>
+          </p:spPr>
+        </p:pic>
+        <p:grpSp>
+          <p:nvGrpSpPr>
+            <p:cNvPr id="17" name="Groep 16">
+              <a:extLst>
+                <a:ext uri="{FF2B5EF4-FFF2-40B4-BE49-F238E27FC236}">
+                  <a16:creationId xmlns:a16="http://schemas.microsoft.com/office/drawing/2014/main" id="{FCF684B7-3CAA-413D-8091-899AD0655ECF}"/>
+                </a:ext>
+              </a:extLst>
+            </p:cNvPr>
+            <p:cNvGrpSpPr/>
+            <p:nvPr/>
+          </p:nvGrpSpPr>
+          <p:grpSpPr>
+            <a:xfrm>
+              <a:off x="4288885" y="5089710"/>
+              <a:ext cx="3587118" cy="665029"/>
+              <a:chOff x="4181370" y="5089710"/>
+              <a:chExt cx="3587118" cy="665029"/>
+            </a:xfrm>
+          </p:grpSpPr>
+          <p:pic>
+            <p:nvPicPr>
+              <p:cNvPr id="7" name="Afbeelding 6" descr="https://latex.codecogs.com/gif.latex?%5Cdpi%7B300%7D%20%5CLARGE%20t%20%5Ccdot%20c%5E2%20%5C%3B%20%5B%5Ctext%7Bsg%7D%5E2/%5Ctext%7BL%7D%5E%7B2%7D%5D">
+                <a:extLst>
+                  <a:ext uri="{FF2B5EF4-FFF2-40B4-BE49-F238E27FC236}">
+                    <a16:creationId xmlns:a16="http://schemas.microsoft.com/office/drawing/2014/main" id="{2EC20347-0599-4665-95E6-EF77E2A21FA9}"/>
+                  </a:ext>
+                </a:extLst>
+              </p:cNvPr>
+              <p:cNvPicPr>
+                <a:picLocks noChangeAspect="1" noChangeArrowheads="1"/>
+              </p:cNvPicPr>
+              <p:nvPr/>
+            </p:nvPicPr>
+            <p:blipFill>
+              <a:blip r:embed="rId4">
+                <a:extLst>
+                  <a:ext uri="{28A0092B-C50C-407E-A947-70E740481C1C}">
+                    <a14:useLocalDpi xmlns:a14="http://schemas.microsoft.com/office/drawing/2010/main" val="0"/>
+                  </a:ext>
+                </a:extLst>
+              </a:blip>
+              <a:srcRect/>
+              <a:stretch>
+                <a:fillRect/>
+              </a:stretch>
+            </p:blipFill>
+            <p:spPr bwMode="auto">
+              <a:xfrm>
+                <a:off x="5409999" y="5089710"/>
+                <a:ext cx="1129860" cy="246935"/>
+              </a:xfrm>
+              <a:prstGeom prst="rect">
+                <a:avLst/>
+              </a:prstGeom>
+              <a:noFill/>
+              <a:extLst>
+                <a:ext uri="{909E8E84-426E-40DD-AFC4-6F175D3DCCD1}">
+                  <a14:hiddenFill xmlns:a14="http://schemas.microsoft.com/office/drawing/2010/main">
+                    <a:solidFill>
+                      <a:srgbClr val="FFFFFF"/>
+                    </a:solidFill>
+                  </a14:hiddenFill>
+                </a:ext>
+              </a:extLst>
+            </p:spPr>
+          </p:pic>
+          <p:grpSp>
+            <p:nvGrpSpPr>
+              <p:cNvPr id="23" name="Groep 22">
+                <a:extLst>
+                  <a:ext uri="{FF2B5EF4-FFF2-40B4-BE49-F238E27FC236}">
+                    <a16:creationId xmlns:a16="http://schemas.microsoft.com/office/drawing/2014/main" id="{04C69006-1085-43EB-829C-2DE9E26EEE53}"/>
+                  </a:ext>
+                </a:extLst>
+              </p:cNvPr>
+              <p:cNvGrpSpPr/>
+              <p:nvPr/>
+            </p:nvGrpSpPr>
+            <p:grpSpPr>
+              <a:xfrm>
+                <a:off x="4181370" y="5446962"/>
+                <a:ext cx="3587118" cy="307777"/>
+                <a:chOff x="3784121" y="5657439"/>
+                <a:chExt cx="3587118" cy="307777"/>
+              </a:xfrm>
+            </p:grpSpPr>
+            <p:grpSp>
+              <p:nvGrpSpPr>
+                <p:cNvPr id="10" name="Groep 9">
+                  <a:extLst>
+                    <a:ext uri="{FF2B5EF4-FFF2-40B4-BE49-F238E27FC236}">
+                      <a16:creationId xmlns:a16="http://schemas.microsoft.com/office/drawing/2014/main" id="{7F9FBC6A-301C-42B1-8B70-A6305718985A}"/>
+                    </a:ext>
+                  </a:extLst>
+                </p:cNvPr>
+                <p:cNvGrpSpPr/>
+                <p:nvPr/>
+              </p:nvGrpSpPr>
+              <p:grpSpPr>
+                <a:xfrm>
+                  <a:off x="5660769" y="5657439"/>
+                  <a:ext cx="834807" cy="307777"/>
+                  <a:chOff x="3631721" y="5505039"/>
+                  <a:chExt cx="834807" cy="307777"/>
+                </a:xfrm>
+              </p:grpSpPr>
+              <p:sp>
+                <p:nvSpPr>
+                  <p:cNvPr id="8" name="Ovaal 7">
+                    <a:extLst>
+                      <a:ext uri="{FF2B5EF4-FFF2-40B4-BE49-F238E27FC236}">
+                        <a16:creationId xmlns:a16="http://schemas.microsoft.com/office/drawing/2014/main" id="{21D71338-245C-4011-8393-99153A030423}"/>
+                      </a:ext>
+                    </a:extLst>
+                  </p:cNvPr>
+                  <p:cNvSpPr/>
+                  <p:nvPr/>
+                </p:nvSpPr>
+                <p:spPr>
+                  <a:xfrm>
+                    <a:off x="3631721" y="5607170"/>
+                    <a:ext cx="103517" cy="103517"/>
+                  </a:xfrm>
+                  <a:prstGeom prst="ellipse">
+                    <a:avLst/>
+                  </a:prstGeom>
+                  <a:solidFill>
+                    <a:srgbClr val="FDCC02"/>
+                  </a:solidFill>
+                  <a:ln>
+                    <a:solidFill>
+                      <a:srgbClr val="FDCC02"/>
+                    </a:solidFill>
+                  </a:ln>
+                </p:spPr>
+                <p:style>
+                  <a:lnRef idx="2">
+                    <a:schemeClr val="accent1">
+                      <a:shade val="50000"/>
+                    </a:schemeClr>
+                  </a:lnRef>
+                  <a:fillRef idx="1">
+                    <a:schemeClr val="accent1"/>
+                  </a:fillRef>
+                  <a:effectRef idx="0">
+                    <a:schemeClr val="accent1"/>
+                  </a:effectRef>
+                  <a:fontRef idx="minor">
+                    <a:schemeClr val="lt1"/>
+                  </a:fontRef>
+                </p:style>
+                <p:txBody>
+                  <a:bodyPr rtlCol="0" anchor="ctr"/>
+                  <a:lstStyle/>
+                  <a:p>
+                    <a:pPr algn="ctr"/>
+                    <a:endParaRPr lang="nl-NL"/>
+                  </a:p>
+                </p:txBody>
+              </p:sp>
+              <p:sp>
+                <p:nvSpPr>
+                  <p:cNvPr id="9" name="Tekstvak 8">
+                    <a:extLst>
+                      <a:ext uri="{FF2B5EF4-FFF2-40B4-BE49-F238E27FC236}">
+                        <a16:creationId xmlns:a16="http://schemas.microsoft.com/office/drawing/2014/main" id="{D44E6708-F359-48D9-AD8C-DD72AC141B96}"/>
+                      </a:ext>
+                    </a:extLst>
+                  </p:cNvPr>
+                  <p:cNvSpPr txBox="1"/>
+                  <p:nvPr/>
+                </p:nvSpPr>
+                <p:spPr>
+                  <a:xfrm>
+                    <a:off x="3735238" y="5505039"/>
+                    <a:ext cx="731290" cy="307777"/>
+                  </a:xfrm>
+                  <a:prstGeom prst="rect">
+                    <a:avLst/>
+                  </a:prstGeom>
+                  <a:noFill/>
+                </p:spPr>
+                <p:txBody>
+                  <a:bodyPr wrap="none" rtlCol="0">
+                    <a:spAutoFit/>
+                  </a:bodyPr>
+                  <a:lstStyle/>
+                  <a:p>
+                    <a:r>
+                      <a:rPr lang="nl-NL" sz="1400" dirty="0">
+                        <a:latin typeface="Arial" panose="020B0604020202020204" pitchFamily="34" charset="0"/>
+                        <a:ea typeface="Verdana" panose="020B0604030504040204" pitchFamily="34" charset="0"/>
+                        <a:cs typeface="Arial" panose="020B0604020202020204" pitchFamily="34" charset="0"/>
+                      </a:rPr>
+                      <a:t>2.5 g/L</a:t>
+                    </a:r>
+                  </a:p>
+                </p:txBody>
+              </p:sp>
+            </p:grpSp>
+            <p:grpSp>
+              <p:nvGrpSpPr>
+                <p:cNvPr id="11" name="Groep 10">
+                  <a:extLst>
+                    <a:ext uri="{FF2B5EF4-FFF2-40B4-BE49-F238E27FC236}">
+                      <a16:creationId xmlns:a16="http://schemas.microsoft.com/office/drawing/2014/main" id="{1F52DA72-FE4D-4EF3-9291-879A43110468}"/>
+                    </a:ext>
+                  </a:extLst>
+                </p:cNvPr>
+                <p:cNvGrpSpPr/>
+                <p:nvPr/>
+              </p:nvGrpSpPr>
+              <p:grpSpPr>
+                <a:xfrm>
+                  <a:off x="4722445" y="5657439"/>
+                  <a:ext cx="834807" cy="307777"/>
+                  <a:chOff x="3631721" y="5505039"/>
+                  <a:chExt cx="834807" cy="307777"/>
+                </a:xfrm>
+              </p:grpSpPr>
+              <p:sp>
+                <p:nvSpPr>
+                  <p:cNvPr id="12" name="Ovaal 11">
+                    <a:extLst>
+                      <a:ext uri="{FF2B5EF4-FFF2-40B4-BE49-F238E27FC236}">
+                        <a16:creationId xmlns:a16="http://schemas.microsoft.com/office/drawing/2014/main" id="{F43A4B6A-4EA4-4751-9612-196DE3D53D3D}"/>
+                      </a:ext>
+                    </a:extLst>
+                  </p:cNvPr>
+                  <p:cNvSpPr/>
+                  <p:nvPr/>
+                </p:nvSpPr>
+                <p:spPr>
+                  <a:xfrm>
+                    <a:off x="3631721" y="5607170"/>
+                    <a:ext cx="103517" cy="103517"/>
+                  </a:xfrm>
+                  <a:prstGeom prst="ellipse">
+                    <a:avLst/>
+                  </a:prstGeom>
+                  <a:solidFill>
+                    <a:srgbClr val="FF0606"/>
+                  </a:solidFill>
+                  <a:ln>
+                    <a:solidFill>
+                      <a:srgbClr val="FF0606"/>
+                    </a:solidFill>
+                  </a:ln>
+                </p:spPr>
+                <p:style>
+                  <a:lnRef idx="2">
+                    <a:schemeClr val="accent1">
+                      <a:shade val="50000"/>
+                    </a:schemeClr>
+                  </a:lnRef>
+                  <a:fillRef idx="1">
+                    <a:schemeClr val="accent1"/>
+                  </a:fillRef>
+                  <a:effectRef idx="0">
+                    <a:schemeClr val="accent1"/>
+                  </a:effectRef>
+                  <a:fontRef idx="minor">
+                    <a:schemeClr val="lt1"/>
+                  </a:fontRef>
+                </p:style>
+                <p:txBody>
+                  <a:bodyPr rtlCol="0" anchor="ctr"/>
+                  <a:lstStyle/>
+                  <a:p>
+                    <a:pPr algn="ctr"/>
+                    <a:endParaRPr lang="nl-NL"/>
+                  </a:p>
+                </p:txBody>
+              </p:sp>
+              <p:sp>
+                <p:nvSpPr>
+                  <p:cNvPr id="13" name="Tekstvak 12">
+                    <a:extLst>
+                      <a:ext uri="{FF2B5EF4-FFF2-40B4-BE49-F238E27FC236}">
+                        <a16:creationId xmlns:a16="http://schemas.microsoft.com/office/drawing/2014/main" id="{AB380355-AA47-47E4-85EC-C1C1973544AA}"/>
+                      </a:ext>
+                    </a:extLst>
+                  </p:cNvPr>
+                  <p:cNvSpPr txBox="1"/>
+                  <p:nvPr/>
+                </p:nvSpPr>
+                <p:spPr>
+                  <a:xfrm>
+                    <a:off x="3735238" y="5505039"/>
+                    <a:ext cx="731290" cy="307777"/>
+                  </a:xfrm>
+                  <a:prstGeom prst="rect">
+                    <a:avLst/>
+                  </a:prstGeom>
+                  <a:noFill/>
+                </p:spPr>
+                <p:txBody>
+                  <a:bodyPr wrap="none" rtlCol="0">
+                    <a:spAutoFit/>
+                  </a:bodyPr>
+                  <a:lstStyle/>
+                  <a:p>
+                    <a:r>
+                      <a:rPr lang="nl-NL" sz="1400" dirty="0">
+                        <a:latin typeface="Arial" panose="020B0604020202020204" pitchFamily="34" charset="0"/>
+                        <a:ea typeface="Verdana" panose="020B0604030504040204" pitchFamily="34" charset="0"/>
+                        <a:cs typeface="Arial" panose="020B0604020202020204" pitchFamily="34" charset="0"/>
+                      </a:rPr>
+                      <a:t>1.0 g/L</a:t>
+                    </a:r>
+                  </a:p>
+                </p:txBody>
+              </p:sp>
+            </p:grpSp>
+            <p:grpSp>
+              <p:nvGrpSpPr>
+                <p:cNvPr id="14" name="Groep 13">
+                  <a:extLst>
+                    <a:ext uri="{FF2B5EF4-FFF2-40B4-BE49-F238E27FC236}">
+                      <a16:creationId xmlns:a16="http://schemas.microsoft.com/office/drawing/2014/main" id="{E9F63ACE-CFBE-4F41-B2B4-AA4CE10737EE}"/>
+                    </a:ext>
+                  </a:extLst>
+                </p:cNvPr>
+                <p:cNvGrpSpPr/>
+                <p:nvPr/>
+              </p:nvGrpSpPr>
+              <p:grpSpPr>
+                <a:xfrm>
+                  <a:off x="3784121" y="5657439"/>
+                  <a:ext cx="834807" cy="307777"/>
+                  <a:chOff x="3631721" y="5505039"/>
+                  <a:chExt cx="834807" cy="307777"/>
+                </a:xfrm>
+              </p:grpSpPr>
+              <p:sp>
+                <p:nvSpPr>
+                  <p:cNvPr id="15" name="Ovaal 14">
+                    <a:extLst>
+                      <a:ext uri="{FF2B5EF4-FFF2-40B4-BE49-F238E27FC236}">
+                        <a16:creationId xmlns:a16="http://schemas.microsoft.com/office/drawing/2014/main" id="{13D42F20-ED83-45EC-BEF7-98665C2A0CC0}"/>
+                      </a:ext>
+                    </a:extLst>
+                  </p:cNvPr>
+                  <p:cNvSpPr/>
+                  <p:nvPr/>
+                </p:nvSpPr>
+                <p:spPr>
+                  <a:xfrm>
+                    <a:off x="3631721" y="5607170"/>
+                    <a:ext cx="103517" cy="103517"/>
+                  </a:xfrm>
+                  <a:prstGeom prst="ellipse">
+                    <a:avLst/>
+                  </a:prstGeom>
+                  <a:solidFill>
+                    <a:srgbClr val="0606FF"/>
+                  </a:solidFill>
+                  <a:ln>
+                    <a:solidFill>
+                      <a:srgbClr val="0606FF"/>
+                    </a:solidFill>
+                  </a:ln>
+                </p:spPr>
+                <p:style>
+                  <a:lnRef idx="2">
+                    <a:schemeClr val="accent1">
+                      <a:shade val="50000"/>
+                    </a:schemeClr>
+                  </a:lnRef>
+                  <a:fillRef idx="1">
+                    <a:schemeClr val="accent1"/>
+                  </a:fillRef>
+                  <a:effectRef idx="0">
+                    <a:schemeClr val="accent1"/>
+                  </a:effectRef>
+                  <a:fontRef idx="minor">
+                    <a:schemeClr val="lt1"/>
+                  </a:fontRef>
+                </p:style>
+                <p:txBody>
+                  <a:bodyPr rtlCol="0" anchor="ctr"/>
+                  <a:lstStyle/>
+                  <a:p>
+                    <a:pPr algn="ctr"/>
+                    <a:endParaRPr lang="nl-NL"/>
+                  </a:p>
+                </p:txBody>
+              </p:sp>
+              <p:sp>
+                <p:nvSpPr>
+                  <p:cNvPr id="16" name="Tekstvak 15">
+                    <a:extLst>
+                      <a:ext uri="{FF2B5EF4-FFF2-40B4-BE49-F238E27FC236}">
+                        <a16:creationId xmlns:a16="http://schemas.microsoft.com/office/drawing/2014/main" id="{EF0AF73D-C19F-455D-8D00-EBFD8659497E}"/>
+                      </a:ext>
+                    </a:extLst>
+                  </p:cNvPr>
+                  <p:cNvSpPr txBox="1"/>
+                  <p:nvPr/>
+                </p:nvSpPr>
+                <p:spPr>
+                  <a:xfrm>
+                    <a:off x="3735238" y="5505039"/>
+                    <a:ext cx="731290" cy="307777"/>
+                  </a:xfrm>
+                  <a:prstGeom prst="rect">
+                    <a:avLst/>
+                  </a:prstGeom>
+                  <a:noFill/>
+                </p:spPr>
+                <p:txBody>
+                  <a:bodyPr wrap="none" rtlCol="0">
+                    <a:spAutoFit/>
+                  </a:bodyPr>
+                  <a:lstStyle/>
+                  <a:p>
+                    <a:r>
+                      <a:rPr lang="nl-NL" sz="1400" dirty="0">
+                        <a:latin typeface="Arial" panose="020B0604020202020204" pitchFamily="34" charset="0"/>
+                        <a:ea typeface="Verdana" panose="020B0604030504040204" pitchFamily="34" charset="0"/>
+                        <a:cs typeface="Arial" panose="020B0604020202020204" pitchFamily="34" charset="0"/>
+                      </a:rPr>
+                      <a:t>0.1 g/L</a:t>
+                    </a:r>
+                  </a:p>
+                </p:txBody>
+              </p:sp>
+            </p:grpSp>
+            <p:grpSp>
+              <p:nvGrpSpPr>
+                <p:cNvPr id="20" name="Groep 19">
+                  <a:extLst>
+                    <a:ext uri="{FF2B5EF4-FFF2-40B4-BE49-F238E27FC236}">
+                      <a16:creationId xmlns:a16="http://schemas.microsoft.com/office/drawing/2014/main" id="{E76A2196-37DA-45A6-BBFB-795BBAAF41DC}"/>
+                    </a:ext>
+                  </a:extLst>
+                </p:cNvPr>
+                <p:cNvGrpSpPr/>
+                <p:nvPr/>
+              </p:nvGrpSpPr>
+              <p:grpSpPr>
+                <a:xfrm>
+                  <a:off x="6586125" y="5657439"/>
+                  <a:ext cx="785114" cy="307777"/>
+                  <a:chOff x="3631721" y="5505039"/>
+                  <a:chExt cx="785114" cy="307777"/>
+                </a:xfrm>
+              </p:grpSpPr>
+              <p:sp>
+                <p:nvSpPr>
+                  <p:cNvPr id="21" name="Ovaal 20">
+                    <a:extLst>
+                      <a:ext uri="{FF2B5EF4-FFF2-40B4-BE49-F238E27FC236}">
+                        <a16:creationId xmlns:a16="http://schemas.microsoft.com/office/drawing/2014/main" id="{93E5C273-F8F0-47B6-BE2F-D74D9EF2B7D5}"/>
+                      </a:ext>
+                    </a:extLst>
+                  </p:cNvPr>
+                  <p:cNvSpPr/>
+                  <p:nvPr/>
+                </p:nvSpPr>
+                <p:spPr>
+                  <a:xfrm>
+                    <a:off x="3631721" y="5607170"/>
+                    <a:ext cx="103517" cy="103517"/>
+                  </a:xfrm>
+                  <a:prstGeom prst="ellipse">
+                    <a:avLst/>
+                  </a:prstGeom>
+                  <a:solidFill>
+                    <a:srgbClr val="36CC36"/>
+                  </a:solidFill>
+                  <a:ln>
+                    <a:solidFill>
+                      <a:srgbClr val="36CC36"/>
+                    </a:solidFill>
+                  </a:ln>
+                </p:spPr>
+                <p:style>
+                  <a:lnRef idx="2">
+                    <a:schemeClr val="accent1">
+                      <a:shade val="50000"/>
+                    </a:schemeClr>
+                  </a:lnRef>
+                  <a:fillRef idx="1">
+                    <a:schemeClr val="accent1"/>
+                  </a:fillRef>
+                  <a:effectRef idx="0">
+                    <a:schemeClr val="accent1"/>
+                  </a:effectRef>
+                  <a:fontRef idx="minor">
+                    <a:schemeClr val="lt1"/>
+                  </a:fontRef>
+                </p:style>
+                <p:txBody>
+                  <a:bodyPr rtlCol="0" anchor="ctr"/>
+                  <a:lstStyle/>
+                  <a:p>
+                    <a:pPr algn="ctr"/>
+                    <a:endParaRPr lang="nl-NL"/>
+                  </a:p>
+                </p:txBody>
+              </p:sp>
+              <p:sp>
+                <p:nvSpPr>
+                  <p:cNvPr id="22" name="Tekstvak 21">
+                    <a:extLst>
+                      <a:ext uri="{FF2B5EF4-FFF2-40B4-BE49-F238E27FC236}">
+                        <a16:creationId xmlns:a16="http://schemas.microsoft.com/office/drawing/2014/main" id="{254427C0-1CBB-479F-9934-BA4A183EE057}"/>
+                      </a:ext>
+                    </a:extLst>
+                  </p:cNvPr>
+                  <p:cNvSpPr txBox="1"/>
+                  <p:nvPr/>
+                </p:nvSpPr>
+                <p:spPr>
+                  <a:xfrm>
+                    <a:off x="3735238" y="5505039"/>
+                    <a:ext cx="681597" cy="307777"/>
+                  </a:xfrm>
+                  <a:prstGeom prst="rect">
+                    <a:avLst/>
+                  </a:prstGeom>
+                  <a:noFill/>
+                </p:spPr>
+                <p:txBody>
+                  <a:bodyPr wrap="none" rtlCol="0">
+                    <a:spAutoFit/>
+                  </a:bodyPr>
+                  <a:lstStyle/>
+                  <a:p>
+                    <a:r>
+                      <a:rPr lang="nl-NL" sz="1400" dirty="0">
+                        <a:latin typeface="Arial" panose="020B0604020202020204" pitchFamily="34" charset="0"/>
+                        <a:ea typeface="Verdana" panose="020B0604030504040204" pitchFamily="34" charset="0"/>
+                        <a:cs typeface="Arial" panose="020B0604020202020204" pitchFamily="34" charset="0"/>
+                      </a:rPr>
+                      <a:t>10 g/L</a:t>
+                    </a:r>
+                  </a:p>
+                </p:txBody>
+              </p:sp>
+            </p:grpSp>
+          </p:grpSp>
+        </p:grpSp>
+      </p:grpSp>
+      <p:sp>
+        <p:nvSpPr>
+          <p:cNvPr id="19" name="Tekstvak 18">
+            <a:extLst>
+              <a:ext uri="{FF2B5EF4-FFF2-40B4-BE49-F238E27FC236}">
+                <a16:creationId xmlns:a16="http://schemas.microsoft.com/office/drawing/2014/main" id="{3890BCB6-1FB7-4FFB-9045-44AC4F0E7798}"/>
+              </a:ext>
+            </a:extLst>
+          </p:cNvPr>
+          <p:cNvSpPr txBox="1"/>
+          <p:nvPr/>
+        </p:nvSpPr>
+        <p:spPr>
+          <a:xfrm>
+            <a:off x="5098211" y="327804"/>
+            <a:ext cx="1513043" cy="369332"/>
+          </a:xfrm>
+          <a:prstGeom prst="rect">
+            <a:avLst/>
+          </a:prstGeom>
+          <a:noFill/>
+        </p:spPr>
+        <p:txBody>
+          <a:bodyPr wrap="none" rtlCol="0">
+            <a:spAutoFit/>
+          </a:bodyPr>
+          <a:lstStyle/>
+          <a:p>
+            <a:r>
+              <a:rPr lang="nl-NL" dirty="0"/>
+              <a:t>Nieuwe fitting</a:t>
+            </a:r>
+          </a:p>
+        </p:txBody>
+      </p:sp>
+    </p:spTree>
+    <p:extLst>
+      <p:ext uri="{BB962C8B-B14F-4D97-AF65-F5344CB8AC3E}">
+        <p14:creationId xmlns:p14="http://schemas.microsoft.com/office/powerpoint/2010/main" val="2855515495"/>
+      </p:ext>
+    </p:extLst>
+  </p:cSld>
+  <p:clrMapOvr>
+    <a:masterClrMapping/>
+  </p:clrMapOvr>
+</p:sld>
+</file>
+
+<file path=ppt/slides/slide4.xml><?xml version="1.0" encoding="utf-8"?>
+<p:sld xmlns:a="http://schemas.openxmlformats.org/drawingml/2006/main" xmlns:r="http://schemas.openxmlformats.org/officeDocument/2006/relationships" xmlns:p="http://schemas.openxmlformats.org/presentationml/2006/main">
+  <p:cSld>
+    <p:spTree>
+      <p:nvGrpSpPr>
+        <p:cNvPr id="1" name=""/>
+        <p:cNvGrpSpPr/>
+        <p:nvPr/>
+      </p:nvGrpSpPr>
+      <p:grpSpPr>
+        <a:xfrm>
+          <a:off x="0" y="0"/>
+          <a:ext cx="0" cy="0"/>
+          <a:chOff x="0" y="0"/>
+          <a:chExt cx="0" cy="0"/>
+        </a:xfrm>
+      </p:grpSpPr>
+      <p:sp>
+        <p:nvSpPr>
+          <p:cNvPr id="19" name="Tekstvak 18">
+            <a:extLst>
+              <a:ext uri="{FF2B5EF4-FFF2-40B4-BE49-F238E27FC236}">
+                <a16:creationId xmlns:a16="http://schemas.microsoft.com/office/drawing/2014/main" id="{3890BCB6-1FB7-4FFB-9045-44AC4F0E7798}"/>
+              </a:ext>
+            </a:extLst>
+          </p:cNvPr>
+          <p:cNvSpPr txBox="1"/>
+          <p:nvPr/>
+        </p:nvSpPr>
+        <p:spPr>
+          <a:xfrm>
+            <a:off x="6053670" y="219990"/>
+            <a:ext cx="1513043" cy="369332"/>
+          </a:xfrm>
+          <a:prstGeom prst="rect">
+            <a:avLst/>
+          </a:prstGeom>
+          <a:noFill/>
+        </p:spPr>
+        <p:txBody>
+          <a:bodyPr wrap="none" rtlCol="0">
+            <a:spAutoFit/>
+          </a:bodyPr>
+          <a:lstStyle/>
+          <a:p>
+            <a:r>
+              <a:rPr lang="nl-NL" dirty="0"/>
+              <a:t>Nieuwe fitting</a:t>
+            </a:r>
+          </a:p>
+        </p:txBody>
+      </p:sp>
+      <p:grpSp>
+        <p:nvGrpSpPr>
+          <p:cNvPr id="26" name="Groep 25">
+            <a:extLst>
+              <a:ext uri="{FF2B5EF4-FFF2-40B4-BE49-F238E27FC236}">
+                <a16:creationId xmlns:a16="http://schemas.microsoft.com/office/drawing/2014/main" id="{FFB85681-E8AA-49A6-A226-F6058C5B469F}"/>
+              </a:ext>
+            </a:extLst>
+          </p:cNvPr>
+          <p:cNvGrpSpPr/>
+          <p:nvPr/>
+        </p:nvGrpSpPr>
+        <p:grpSpPr>
+          <a:xfrm>
+            <a:off x="3734619" y="848505"/>
+            <a:ext cx="5858867" cy="5571526"/>
+            <a:chOff x="3734619" y="848505"/>
+            <a:chExt cx="5858867" cy="5571526"/>
+          </a:xfrm>
+        </p:grpSpPr>
+        <p:pic>
+          <p:nvPicPr>
+            <p:cNvPr id="2" name="Afbeelding 1">
+              <a:extLst>
+                <a:ext uri="{FF2B5EF4-FFF2-40B4-BE49-F238E27FC236}">
+                  <a16:creationId xmlns:a16="http://schemas.microsoft.com/office/drawing/2014/main" id="{E8543170-5095-41CF-A93F-B214CD2C8A31}"/>
+                </a:ext>
+              </a:extLst>
+            </p:cNvPr>
+            <p:cNvPicPr>
+              <a:picLocks noChangeAspect="1"/>
+            </p:cNvPicPr>
+            <p:nvPr/>
+          </p:nvPicPr>
+          <p:blipFill rotWithShape="1">
+            <a:blip r:embed="rId2"/>
+            <a:srcRect b="29990"/>
+            <a:stretch/>
+          </p:blipFill>
+          <p:spPr>
+            <a:xfrm>
+              <a:off x="4064403" y="848505"/>
+              <a:ext cx="5529083" cy="2321201"/>
+            </a:xfrm>
+            <a:prstGeom prst="rect">
+              <a:avLst/>
+            </a:prstGeom>
+          </p:spPr>
+        </p:pic>
+        <p:grpSp>
+          <p:nvGrpSpPr>
+            <p:cNvPr id="17" name="Groep 16">
+              <a:extLst>
+                <a:ext uri="{FF2B5EF4-FFF2-40B4-BE49-F238E27FC236}">
+                  <a16:creationId xmlns:a16="http://schemas.microsoft.com/office/drawing/2014/main" id="{FCF684B7-3CAA-413D-8091-899AD0655ECF}"/>
+                </a:ext>
+              </a:extLst>
+            </p:cNvPr>
+            <p:cNvGrpSpPr/>
+            <p:nvPr/>
+          </p:nvGrpSpPr>
+          <p:grpSpPr>
+            <a:xfrm>
+              <a:off x="5589040" y="5853488"/>
+              <a:ext cx="2965922" cy="566543"/>
+              <a:chOff x="4181370" y="5089710"/>
+              <a:chExt cx="3659479" cy="699025"/>
+            </a:xfrm>
+          </p:grpSpPr>
+          <p:pic>
+            <p:nvPicPr>
+              <p:cNvPr id="7" name="Afbeelding 6" descr="https://latex.codecogs.com/gif.latex?%5Cdpi%7B300%7D%20%5CLARGE%20t%20%5Ccdot%20c%5E2%20%5C%3B%20%5B%5Ctext%7Bsg%7D%5E2/%5Ctext%7BL%7D%5E%7B2%7D%5D">
+                <a:extLst>
+                  <a:ext uri="{FF2B5EF4-FFF2-40B4-BE49-F238E27FC236}">
+                    <a16:creationId xmlns:a16="http://schemas.microsoft.com/office/drawing/2014/main" id="{2EC20347-0599-4665-95E6-EF77E2A21FA9}"/>
+                  </a:ext>
+                </a:extLst>
+              </p:cNvPr>
+              <p:cNvPicPr>
+                <a:picLocks noChangeAspect="1" noChangeArrowheads="1"/>
+              </p:cNvPicPr>
+              <p:nvPr/>
+            </p:nvPicPr>
+            <p:blipFill>
+              <a:blip r:embed="rId3">
+                <a:extLst>
+                  <a:ext uri="{28A0092B-C50C-407E-A947-70E740481C1C}">
+                    <a14:useLocalDpi xmlns:a14="http://schemas.microsoft.com/office/drawing/2010/main" val="0"/>
+                  </a:ext>
+                </a:extLst>
+              </a:blip>
+              <a:srcRect/>
+              <a:stretch>
+                <a:fillRect/>
+              </a:stretch>
+            </p:blipFill>
+            <p:spPr bwMode="auto">
+              <a:xfrm>
+                <a:off x="5223213" y="5089710"/>
+                <a:ext cx="1316648" cy="287758"/>
+              </a:xfrm>
+              <a:prstGeom prst="rect">
+                <a:avLst/>
+              </a:prstGeom>
+              <a:noFill/>
+              <a:extLst>
+                <a:ext uri="{909E8E84-426E-40DD-AFC4-6F175D3DCCD1}">
+                  <a14:hiddenFill xmlns:a14="http://schemas.microsoft.com/office/drawing/2010/main">
+                    <a:solidFill>
+                      <a:srgbClr val="FFFFFF"/>
+                    </a:solidFill>
+                  </a14:hiddenFill>
+                </a:ext>
+              </a:extLst>
+            </p:spPr>
+          </p:pic>
+          <p:grpSp>
+            <p:nvGrpSpPr>
+              <p:cNvPr id="23" name="Groep 22">
+                <a:extLst>
+                  <a:ext uri="{FF2B5EF4-FFF2-40B4-BE49-F238E27FC236}">
+                    <a16:creationId xmlns:a16="http://schemas.microsoft.com/office/drawing/2014/main" id="{04C69006-1085-43EB-829C-2DE9E26EEE53}"/>
+                  </a:ext>
+                </a:extLst>
+              </p:cNvPr>
+              <p:cNvGrpSpPr/>
+              <p:nvPr/>
+            </p:nvGrpSpPr>
+            <p:grpSpPr>
+              <a:xfrm>
+                <a:off x="4181370" y="5446962"/>
+                <a:ext cx="3659479" cy="341773"/>
+                <a:chOff x="3784121" y="5657439"/>
+                <a:chExt cx="3659479" cy="341773"/>
+              </a:xfrm>
+            </p:grpSpPr>
+            <p:grpSp>
+              <p:nvGrpSpPr>
+                <p:cNvPr id="10" name="Groep 9">
+                  <a:extLst>
+                    <a:ext uri="{FF2B5EF4-FFF2-40B4-BE49-F238E27FC236}">
+                      <a16:creationId xmlns:a16="http://schemas.microsoft.com/office/drawing/2014/main" id="{7F9FBC6A-301C-42B1-8B70-A6305718985A}"/>
+                    </a:ext>
+                  </a:extLst>
+                </p:cNvPr>
+                <p:cNvGrpSpPr/>
+                <p:nvPr/>
+              </p:nvGrpSpPr>
+              <p:grpSpPr>
+                <a:xfrm>
+                  <a:off x="5660769" y="5657439"/>
+                  <a:ext cx="910877" cy="341773"/>
+                  <a:chOff x="3631721" y="5505039"/>
+                  <a:chExt cx="910877" cy="341773"/>
+                </a:xfrm>
+              </p:grpSpPr>
+              <p:sp>
+                <p:nvSpPr>
+                  <p:cNvPr id="8" name="Ovaal 7">
+                    <a:extLst>
+                      <a:ext uri="{FF2B5EF4-FFF2-40B4-BE49-F238E27FC236}">
+                        <a16:creationId xmlns:a16="http://schemas.microsoft.com/office/drawing/2014/main" id="{21D71338-245C-4011-8393-99153A030423}"/>
+                      </a:ext>
+                    </a:extLst>
+                  </p:cNvPr>
+                  <p:cNvSpPr/>
+                  <p:nvPr/>
+                </p:nvSpPr>
+                <p:spPr>
+                  <a:xfrm>
+                    <a:off x="3631721" y="5638510"/>
+                    <a:ext cx="103517" cy="103517"/>
+                  </a:xfrm>
+                  <a:prstGeom prst="ellipse">
+                    <a:avLst/>
+                  </a:prstGeom>
+                  <a:solidFill>
+                    <a:srgbClr val="FDCC02"/>
+                  </a:solidFill>
+                  <a:ln>
+                    <a:solidFill>
+                      <a:srgbClr val="FDCC02"/>
+                    </a:solidFill>
+                  </a:ln>
+                </p:spPr>
+                <p:style>
+                  <a:lnRef idx="2">
+                    <a:schemeClr val="accent1">
+                      <a:shade val="50000"/>
+                    </a:schemeClr>
+                  </a:lnRef>
+                  <a:fillRef idx="1">
+                    <a:schemeClr val="accent1"/>
+                  </a:fillRef>
+                  <a:effectRef idx="0">
+                    <a:schemeClr val="accent1"/>
+                  </a:effectRef>
+                  <a:fontRef idx="minor">
+                    <a:schemeClr val="lt1"/>
+                  </a:fontRef>
+                </p:style>
+                <p:txBody>
+                  <a:bodyPr rtlCol="0" anchor="ctr"/>
+                  <a:lstStyle/>
+                  <a:p>
+                    <a:pPr algn="ctr"/>
+                    <a:endParaRPr lang="nl-NL"/>
+                  </a:p>
+                </p:txBody>
+              </p:sp>
+              <p:sp>
+                <p:nvSpPr>
+                  <p:cNvPr id="9" name="Tekstvak 8">
+                    <a:extLst>
+                      <a:ext uri="{FF2B5EF4-FFF2-40B4-BE49-F238E27FC236}">
+                        <a16:creationId xmlns:a16="http://schemas.microsoft.com/office/drawing/2014/main" id="{D44E6708-F359-48D9-AD8C-DD72AC141B96}"/>
+                      </a:ext>
+                    </a:extLst>
+                  </p:cNvPr>
+                  <p:cNvSpPr txBox="1"/>
+                  <p:nvPr/>
+                </p:nvSpPr>
+                <p:spPr>
+                  <a:xfrm>
+                    <a:off x="3735238" y="5505039"/>
+                    <a:ext cx="807360" cy="341773"/>
+                  </a:xfrm>
+                  <a:prstGeom prst="rect">
+                    <a:avLst/>
+                  </a:prstGeom>
+                  <a:noFill/>
+                </p:spPr>
+                <p:txBody>
+                  <a:bodyPr wrap="none" rtlCol="0">
+                    <a:spAutoFit/>
+                  </a:bodyPr>
+                  <a:lstStyle/>
+                  <a:p>
+                    <a:r>
+                      <a:rPr lang="nl-NL" sz="1200" dirty="0">
+                        <a:latin typeface="Arial" panose="020B0604020202020204" pitchFamily="34" charset="0"/>
+                        <a:ea typeface="Verdana" panose="020B0604030504040204" pitchFamily="34" charset="0"/>
+                        <a:cs typeface="Arial" panose="020B0604020202020204" pitchFamily="34" charset="0"/>
+                      </a:rPr>
+                      <a:t>2.5 g/L</a:t>
+                    </a:r>
+                  </a:p>
+                </p:txBody>
+              </p:sp>
+            </p:grpSp>
+            <p:grpSp>
+              <p:nvGrpSpPr>
+                <p:cNvPr id="11" name="Groep 10">
+                  <a:extLst>
+                    <a:ext uri="{FF2B5EF4-FFF2-40B4-BE49-F238E27FC236}">
+                      <a16:creationId xmlns:a16="http://schemas.microsoft.com/office/drawing/2014/main" id="{1F52DA72-FE4D-4EF3-9291-879A43110468}"/>
+                    </a:ext>
+                  </a:extLst>
+                </p:cNvPr>
+                <p:cNvGrpSpPr/>
+                <p:nvPr/>
+              </p:nvGrpSpPr>
+              <p:grpSpPr>
+                <a:xfrm>
+                  <a:off x="4722445" y="5657439"/>
+                  <a:ext cx="910877" cy="341773"/>
+                  <a:chOff x="3631721" y="5505039"/>
+                  <a:chExt cx="910877" cy="341773"/>
+                </a:xfrm>
+              </p:grpSpPr>
+              <p:sp>
+                <p:nvSpPr>
+                  <p:cNvPr id="12" name="Ovaal 11">
+                    <a:extLst>
+                      <a:ext uri="{FF2B5EF4-FFF2-40B4-BE49-F238E27FC236}">
+                        <a16:creationId xmlns:a16="http://schemas.microsoft.com/office/drawing/2014/main" id="{F43A4B6A-4EA4-4751-9612-196DE3D53D3D}"/>
+                      </a:ext>
+                    </a:extLst>
+                  </p:cNvPr>
+                  <p:cNvSpPr/>
+                  <p:nvPr/>
+                </p:nvSpPr>
+                <p:spPr>
+                  <a:xfrm>
+                    <a:off x="3631721" y="5638510"/>
+                    <a:ext cx="103517" cy="103517"/>
+                  </a:xfrm>
+                  <a:prstGeom prst="ellipse">
+                    <a:avLst/>
+                  </a:prstGeom>
+                  <a:solidFill>
+                    <a:srgbClr val="FF0606"/>
+                  </a:solidFill>
+                  <a:ln>
+                    <a:solidFill>
+                      <a:srgbClr val="FF0606"/>
+                    </a:solidFill>
+                  </a:ln>
+                </p:spPr>
+                <p:style>
+                  <a:lnRef idx="2">
+                    <a:schemeClr val="accent1">
+                      <a:shade val="50000"/>
+                    </a:schemeClr>
+                  </a:lnRef>
+                  <a:fillRef idx="1">
+                    <a:schemeClr val="accent1"/>
+                  </a:fillRef>
+                  <a:effectRef idx="0">
+                    <a:schemeClr val="accent1"/>
+                  </a:effectRef>
+                  <a:fontRef idx="minor">
+                    <a:schemeClr val="lt1"/>
+                  </a:fontRef>
+                </p:style>
+                <p:txBody>
+                  <a:bodyPr rtlCol="0" anchor="ctr"/>
+                  <a:lstStyle/>
+                  <a:p>
+                    <a:pPr algn="ctr"/>
+                    <a:endParaRPr lang="nl-NL"/>
+                  </a:p>
+                </p:txBody>
+              </p:sp>
+              <p:sp>
+                <p:nvSpPr>
+                  <p:cNvPr id="13" name="Tekstvak 12">
+                    <a:extLst>
+                      <a:ext uri="{FF2B5EF4-FFF2-40B4-BE49-F238E27FC236}">
+                        <a16:creationId xmlns:a16="http://schemas.microsoft.com/office/drawing/2014/main" id="{AB380355-AA47-47E4-85EC-C1C1973544AA}"/>
+                      </a:ext>
+                    </a:extLst>
+                  </p:cNvPr>
+                  <p:cNvSpPr txBox="1"/>
+                  <p:nvPr/>
+                </p:nvSpPr>
+                <p:spPr>
+                  <a:xfrm>
+                    <a:off x="3735238" y="5505039"/>
+                    <a:ext cx="807360" cy="341773"/>
+                  </a:xfrm>
+                  <a:prstGeom prst="rect">
+                    <a:avLst/>
+                  </a:prstGeom>
+                  <a:noFill/>
+                </p:spPr>
+                <p:txBody>
+                  <a:bodyPr wrap="none" rtlCol="0">
+                    <a:spAutoFit/>
+                  </a:bodyPr>
+                  <a:lstStyle/>
+                  <a:p>
+                    <a:r>
+                      <a:rPr lang="nl-NL" sz="1200" dirty="0">
+                        <a:latin typeface="Arial" panose="020B0604020202020204" pitchFamily="34" charset="0"/>
+                        <a:ea typeface="Verdana" panose="020B0604030504040204" pitchFamily="34" charset="0"/>
+                        <a:cs typeface="Arial" panose="020B0604020202020204" pitchFamily="34" charset="0"/>
+                      </a:rPr>
+                      <a:t>1.0 g/L</a:t>
+                    </a:r>
+                  </a:p>
+                </p:txBody>
+              </p:sp>
+            </p:grpSp>
+            <p:grpSp>
+              <p:nvGrpSpPr>
+                <p:cNvPr id="14" name="Groep 13">
+                  <a:extLst>
+                    <a:ext uri="{FF2B5EF4-FFF2-40B4-BE49-F238E27FC236}">
+                      <a16:creationId xmlns:a16="http://schemas.microsoft.com/office/drawing/2014/main" id="{E9F63ACE-CFBE-4F41-B2B4-AA4CE10737EE}"/>
+                    </a:ext>
+                  </a:extLst>
+                </p:cNvPr>
+                <p:cNvGrpSpPr/>
+                <p:nvPr/>
+              </p:nvGrpSpPr>
+              <p:grpSpPr>
+                <a:xfrm>
+                  <a:off x="3784121" y="5657439"/>
+                  <a:ext cx="910877" cy="341773"/>
+                  <a:chOff x="3631721" y="5505039"/>
+                  <a:chExt cx="910877" cy="341773"/>
+                </a:xfrm>
+              </p:grpSpPr>
+              <p:sp>
+                <p:nvSpPr>
+                  <p:cNvPr id="15" name="Ovaal 14">
+                    <a:extLst>
+                      <a:ext uri="{FF2B5EF4-FFF2-40B4-BE49-F238E27FC236}">
+                        <a16:creationId xmlns:a16="http://schemas.microsoft.com/office/drawing/2014/main" id="{13D42F20-ED83-45EC-BEF7-98665C2A0CC0}"/>
+                      </a:ext>
+                    </a:extLst>
+                  </p:cNvPr>
+                  <p:cNvSpPr/>
+                  <p:nvPr/>
+                </p:nvSpPr>
+                <p:spPr>
+                  <a:xfrm>
+                    <a:off x="3631721" y="5638510"/>
+                    <a:ext cx="103517" cy="103517"/>
+                  </a:xfrm>
+                  <a:prstGeom prst="ellipse">
+                    <a:avLst/>
+                  </a:prstGeom>
+                  <a:solidFill>
+                    <a:srgbClr val="0606FF"/>
+                  </a:solidFill>
+                  <a:ln>
+                    <a:solidFill>
+                      <a:srgbClr val="0606FF"/>
+                    </a:solidFill>
+                  </a:ln>
+                </p:spPr>
+                <p:style>
+                  <a:lnRef idx="2">
+                    <a:schemeClr val="accent1">
+                      <a:shade val="50000"/>
+                    </a:schemeClr>
+                  </a:lnRef>
+                  <a:fillRef idx="1">
+                    <a:schemeClr val="accent1"/>
+                  </a:fillRef>
+                  <a:effectRef idx="0">
+                    <a:schemeClr val="accent1"/>
+                  </a:effectRef>
+                  <a:fontRef idx="minor">
+                    <a:schemeClr val="lt1"/>
+                  </a:fontRef>
+                </p:style>
+                <p:txBody>
+                  <a:bodyPr rtlCol="0" anchor="ctr"/>
+                  <a:lstStyle/>
+                  <a:p>
+                    <a:pPr algn="ctr"/>
+                    <a:endParaRPr lang="nl-NL"/>
+                  </a:p>
+                </p:txBody>
+              </p:sp>
+              <p:sp>
+                <p:nvSpPr>
+                  <p:cNvPr id="16" name="Tekstvak 15">
+                    <a:extLst>
+                      <a:ext uri="{FF2B5EF4-FFF2-40B4-BE49-F238E27FC236}">
+                        <a16:creationId xmlns:a16="http://schemas.microsoft.com/office/drawing/2014/main" id="{EF0AF73D-C19F-455D-8D00-EBFD8659497E}"/>
+                      </a:ext>
+                    </a:extLst>
+                  </p:cNvPr>
+                  <p:cNvSpPr txBox="1"/>
+                  <p:nvPr/>
+                </p:nvSpPr>
+                <p:spPr>
+                  <a:xfrm>
+                    <a:off x="3735238" y="5505039"/>
+                    <a:ext cx="807360" cy="341773"/>
+                  </a:xfrm>
+                  <a:prstGeom prst="rect">
+                    <a:avLst/>
+                  </a:prstGeom>
+                  <a:noFill/>
+                </p:spPr>
+                <p:txBody>
+                  <a:bodyPr wrap="none" rtlCol="0">
+                    <a:spAutoFit/>
+                  </a:bodyPr>
+                  <a:lstStyle/>
+                  <a:p>
+                    <a:r>
+                      <a:rPr lang="nl-NL" sz="1200" dirty="0">
+                        <a:latin typeface="Arial" panose="020B0604020202020204" pitchFamily="34" charset="0"/>
+                        <a:ea typeface="Verdana" panose="020B0604030504040204" pitchFamily="34" charset="0"/>
+                        <a:cs typeface="Arial" panose="020B0604020202020204" pitchFamily="34" charset="0"/>
+                      </a:rPr>
+                      <a:t>0.1 g/L</a:t>
+                    </a:r>
+                  </a:p>
+                </p:txBody>
+              </p:sp>
+            </p:grpSp>
+            <p:grpSp>
+              <p:nvGrpSpPr>
+                <p:cNvPr id="20" name="Groep 19">
+                  <a:extLst>
+                    <a:ext uri="{FF2B5EF4-FFF2-40B4-BE49-F238E27FC236}">
+                      <a16:creationId xmlns:a16="http://schemas.microsoft.com/office/drawing/2014/main" id="{E76A2196-37DA-45A6-BBFB-795BBAAF41DC}"/>
+                    </a:ext>
+                  </a:extLst>
+                </p:cNvPr>
+                <p:cNvGrpSpPr/>
+                <p:nvPr/>
+              </p:nvGrpSpPr>
+              <p:grpSpPr>
+                <a:xfrm>
+                  <a:off x="6586125" y="5657439"/>
+                  <a:ext cx="857475" cy="341773"/>
+                  <a:chOff x="3631721" y="5505039"/>
+                  <a:chExt cx="857475" cy="341773"/>
+                </a:xfrm>
+              </p:grpSpPr>
+              <p:sp>
+                <p:nvSpPr>
+                  <p:cNvPr id="21" name="Ovaal 20">
+                    <a:extLst>
+                      <a:ext uri="{FF2B5EF4-FFF2-40B4-BE49-F238E27FC236}">
+                        <a16:creationId xmlns:a16="http://schemas.microsoft.com/office/drawing/2014/main" id="{93E5C273-F8F0-47B6-BE2F-D74D9EF2B7D5}"/>
+                      </a:ext>
+                    </a:extLst>
+                  </p:cNvPr>
+                  <p:cNvSpPr/>
+                  <p:nvPr/>
+                </p:nvSpPr>
+                <p:spPr>
+                  <a:xfrm>
+                    <a:off x="3631721" y="5638510"/>
+                    <a:ext cx="103517" cy="103517"/>
+                  </a:xfrm>
+                  <a:prstGeom prst="ellipse">
+                    <a:avLst/>
+                  </a:prstGeom>
+                  <a:solidFill>
+                    <a:srgbClr val="36CC36"/>
+                  </a:solidFill>
+                  <a:ln>
+                    <a:solidFill>
+                      <a:srgbClr val="36CC36"/>
+                    </a:solidFill>
+                  </a:ln>
+                </p:spPr>
+                <p:style>
+                  <a:lnRef idx="2">
+                    <a:schemeClr val="accent1">
+                      <a:shade val="50000"/>
+                    </a:schemeClr>
+                  </a:lnRef>
+                  <a:fillRef idx="1">
+                    <a:schemeClr val="accent1"/>
+                  </a:fillRef>
+                  <a:effectRef idx="0">
+                    <a:schemeClr val="accent1"/>
+                  </a:effectRef>
+                  <a:fontRef idx="minor">
+                    <a:schemeClr val="lt1"/>
+                  </a:fontRef>
+                </p:style>
+                <p:txBody>
+                  <a:bodyPr rtlCol="0" anchor="ctr"/>
+                  <a:lstStyle/>
+                  <a:p>
+                    <a:pPr algn="ctr"/>
+                    <a:endParaRPr lang="nl-NL"/>
+                  </a:p>
+                </p:txBody>
+              </p:sp>
+              <p:sp>
+                <p:nvSpPr>
+                  <p:cNvPr id="22" name="Tekstvak 21">
+                    <a:extLst>
+                      <a:ext uri="{FF2B5EF4-FFF2-40B4-BE49-F238E27FC236}">
+                        <a16:creationId xmlns:a16="http://schemas.microsoft.com/office/drawing/2014/main" id="{254427C0-1CBB-479F-9934-BA4A183EE057}"/>
+                      </a:ext>
+                    </a:extLst>
+                  </p:cNvPr>
+                  <p:cNvSpPr txBox="1"/>
+                  <p:nvPr/>
+                </p:nvSpPr>
+                <p:spPr>
+                  <a:xfrm>
+                    <a:off x="3735238" y="5505039"/>
+                    <a:ext cx="753958" cy="341773"/>
+                  </a:xfrm>
+                  <a:prstGeom prst="rect">
+                    <a:avLst/>
+                  </a:prstGeom>
+                  <a:noFill/>
+                </p:spPr>
+                <p:txBody>
+                  <a:bodyPr wrap="none" rtlCol="0">
+                    <a:spAutoFit/>
+                  </a:bodyPr>
+                  <a:lstStyle/>
+                  <a:p>
+                    <a:r>
+                      <a:rPr lang="nl-NL" sz="1200" dirty="0">
+                        <a:latin typeface="Arial" panose="020B0604020202020204" pitchFamily="34" charset="0"/>
+                        <a:ea typeface="Verdana" panose="020B0604030504040204" pitchFamily="34" charset="0"/>
+                        <a:cs typeface="Arial" panose="020B0604020202020204" pitchFamily="34" charset="0"/>
+                      </a:rPr>
+                      <a:t>10 g/L</a:t>
+                    </a:r>
+                  </a:p>
+                </p:txBody>
+              </p:sp>
+            </p:grpSp>
+          </p:grpSp>
+        </p:grpSp>
+        <p:grpSp>
+          <p:nvGrpSpPr>
+            <p:cNvPr id="25" name="Groep 24">
+              <a:extLst>
+                <a:ext uri="{FF2B5EF4-FFF2-40B4-BE49-F238E27FC236}">
+                  <a16:creationId xmlns:a16="http://schemas.microsoft.com/office/drawing/2014/main" id="{CFECCF96-5F6F-40FE-ACA2-B5A224BCFAE2}"/>
+                </a:ext>
+              </a:extLst>
+            </p:cNvPr>
+            <p:cNvGrpSpPr/>
+            <p:nvPr/>
+          </p:nvGrpSpPr>
+          <p:grpSpPr>
+            <a:xfrm>
+              <a:off x="4064403" y="3203698"/>
+              <a:ext cx="5529083" cy="2617383"/>
+              <a:chOff x="4064403" y="3688295"/>
+              <a:chExt cx="5529083" cy="2617383"/>
+            </a:xfrm>
+          </p:grpSpPr>
+          <p:sp>
+            <p:nvSpPr>
+              <p:cNvPr id="3" name="Tekstvak 2">
+                <a:extLst>
+                  <a:ext uri="{FF2B5EF4-FFF2-40B4-BE49-F238E27FC236}">
+                    <a16:creationId xmlns:a16="http://schemas.microsoft.com/office/drawing/2014/main" id="{C704E5CB-715E-4719-971A-68906C6DDEDF}"/>
+                  </a:ext>
+                </a:extLst>
+              </p:cNvPr>
+              <p:cNvSpPr txBox="1"/>
+              <p:nvPr/>
+            </p:nvSpPr>
+            <p:spPr>
+              <a:xfrm>
+                <a:off x="4334349" y="5997901"/>
+                <a:ext cx="433132" cy="307777"/>
+              </a:xfrm>
+              <a:prstGeom prst="rect">
+                <a:avLst/>
+              </a:prstGeom>
+              <a:noFill/>
+            </p:spPr>
+            <p:txBody>
+              <a:bodyPr wrap="none" rtlCol="0">
+                <a:spAutoFit/>
+              </a:bodyPr>
+              <a:lstStyle/>
+              <a:p>
+                <a:r>
+                  <a:rPr lang="nl-NL" sz="1400" dirty="0">
+                    <a:latin typeface="Arial" panose="020B0604020202020204" pitchFamily="34" charset="0"/>
+                    <a:cs typeface="Arial" panose="020B0604020202020204" pitchFamily="34" charset="0"/>
+                  </a:rPr>
+                  <a:t>0.1</a:t>
+                </a:r>
+              </a:p>
+            </p:txBody>
+          </p:sp>
+          <p:sp>
+            <p:nvSpPr>
+              <p:cNvPr id="28" name="Tekstvak 27">
+                <a:extLst>
+                  <a:ext uri="{FF2B5EF4-FFF2-40B4-BE49-F238E27FC236}">
+                    <a16:creationId xmlns:a16="http://schemas.microsoft.com/office/drawing/2014/main" id="{4FC238E7-00E4-48E7-BB5A-11BA822ACF84}"/>
+                  </a:ext>
+                </a:extLst>
+              </p:cNvPr>
+              <p:cNvSpPr txBox="1"/>
+              <p:nvPr/>
+            </p:nvSpPr>
+            <p:spPr>
+              <a:xfrm>
+                <a:off x="5090493" y="5997901"/>
+                <a:ext cx="284052" cy="307777"/>
+              </a:xfrm>
+              <a:prstGeom prst="rect">
+                <a:avLst/>
+              </a:prstGeom>
+              <a:noFill/>
+            </p:spPr>
+            <p:txBody>
+              <a:bodyPr wrap="none" rtlCol="0">
+                <a:spAutoFit/>
+              </a:bodyPr>
+              <a:lstStyle/>
+              <a:p>
+                <a:r>
+                  <a:rPr lang="nl-NL" sz="1400" dirty="0">
+                    <a:latin typeface="Arial" panose="020B0604020202020204" pitchFamily="34" charset="0"/>
+                    <a:cs typeface="Arial" panose="020B0604020202020204" pitchFamily="34" charset="0"/>
+                  </a:rPr>
+                  <a:t>1</a:t>
+                </a:r>
+                <a:endParaRPr lang="nl-NL" sz="1400" baseline="30000" dirty="0">
+                  <a:latin typeface="Arial" panose="020B0604020202020204" pitchFamily="34" charset="0"/>
+                  <a:cs typeface="Arial" panose="020B0604020202020204" pitchFamily="34" charset="0"/>
+                </a:endParaRPr>
+              </a:p>
+            </p:txBody>
+          </p:sp>
+          <p:sp>
+            <p:nvSpPr>
+              <p:cNvPr id="29" name="Tekstvak 28">
+                <a:extLst>
+                  <a:ext uri="{FF2B5EF4-FFF2-40B4-BE49-F238E27FC236}">
+                    <a16:creationId xmlns:a16="http://schemas.microsoft.com/office/drawing/2014/main" id="{1DCD742D-3F68-46C3-9D52-F5DB2F80EEE0}"/>
+                  </a:ext>
+                </a:extLst>
+              </p:cNvPr>
+              <p:cNvSpPr txBox="1"/>
+              <p:nvPr/>
+            </p:nvSpPr>
+            <p:spPr>
+              <a:xfrm>
+                <a:off x="5716792" y="5997901"/>
+                <a:ext cx="383438" cy="307777"/>
+              </a:xfrm>
+              <a:prstGeom prst="rect">
+                <a:avLst/>
+              </a:prstGeom>
+              <a:noFill/>
+            </p:spPr>
+            <p:txBody>
+              <a:bodyPr wrap="none" rtlCol="0">
+                <a:spAutoFit/>
+              </a:bodyPr>
+              <a:lstStyle/>
+              <a:p>
+                <a:r>
+                  <a:rPr lang="nl-NL" sz="1400" dirty="0">
+                    <a:latin typeface="Arial" panose="020B0604020202020204" pitchFamily="34" charset="0"/>
+                    <a:cs typeface="Arial" panose="020B0604020202020204" pitchFamily="34" charset="0"/>
+                  </a:rPr>
+                  <a:t>10</a:t>
+                </a:r>
+                <a:endParaRPr lang="nl-NL" sz="1400" baseline="30000" dirty="0">
+                  <a:latin typeface="Arial" panose="020B0604020202020204" pitchFamily="34" charset="0"/>
+                  <a:cs typeface="Arial" panose="020B0604020202020204" pitchFamily="34" charset="0"/>
+                </a:endParaRPr>
+              </a:p>
+            </p:txBody>
+          </p:sp>
+          <p:sp>
+            <p:nvSpPr>
+              <p:cNvPr id="31" name="Tekstvak 30">
+                <a:extLst>
+                  <a:ext uri="{FF2B5EF4-FFF2-40B4-BE49-F238E27FC236}">
+                    <a16:creationId xmlns:a16="http://schemas.microsoft.com/office/drawing/2014/main" id="{0E809666-D165-4557-BC1D-AA0CE9C33695}"/>
+                  </a:ext>
+                </a:extLst>
+              </p:cNvPr>
+              <p:cNvSpPr txBox="1"/>
+              <p:nvPr/>
+            </p:nvSpPr>
+            <p:spPr>
+              <a:xfrm>
+                <a:off x="6359428" y="5996610"/>
+                <a:ext cx="450764" cy="307777"/>
+              </a:xfrm>
+              <a:prstGeom prst="rect">
+                <a:avLst/>
+              </a:prstGeom>
+              <a:noFill/>
+            </p:spPr>
+            <p:txBody>
+              <a:bodyPr wrap="none" rtlCol="0">
+                <a:spAutoFit/>
+              </a:bodyPr>
+              <a:lstStyle/>
+              <a:p>
+                <a:r>
+                  <a:rPr lang="nl-NL" sz="1400" dirty="0">
+                    <a:latin typeface="Arial" panose="020B0604020202020204" pitchFamily="34" charset="0"/>
+                    <a:cs typeface="Arial" panose="020B0604020202020204" pitchFamily="34" charset="0"/>
+                  </a:rPr>
+                  <a:t>10</a:t>
+                </a:r>
+                <a:r>
+                  <a:rPr lang="nl-NL" sz="1400" baseline="30000" dirty="0">
+                    <a:latin typeface="Arial" panose="020B0604020202020204" pitchFamily="34" charset="0"/>
+                    <a:cs typeface="Arial" panose="020B0604020202020204" pitchFamily="34" charset="0"/>
+                  </a:rPr>
+                  <a:t>2</a:t>
+                </a:r>
+              </a:p>
+            </p:txBody>
+          </p:sp>
+          <p:sp>
+            <p:nvSpPr>
+              <p:cNvPr id="32" name="Tekstvak 31">
+                <a:extLst>
+                  <a:ext uri="{FF2B5EF4-FFF2-40B4-BE49-F238E27FC236}">
+                    <a16:creationId xmlns:a16="http://schemas.microsoft.com/office/drawing/2014/main" id="{96543CB5-9F27-48E8-A6DF-75868B1E4B22}"/>
+                  </a:ext>
+                </a:extLst>
+              </p:cNvPr>
+              <p:cNvSpPr txBox="1"/>
+              <p:nvPr/>
+            </p:nvSpPr>
+            <p:spPr>
+              <a:xfrm>
+                <a:off x="7042678" y="5996610"/>
+                <a:ext cx="450764" cy="307777"/>
+              </a:xfrm>
+              <a:prstGeom prst="rect">
+                <a:avLst/>
+              </a:prstGeom>
+              <a:noFill/>
+            </p:spPr>
+            <p:txBody>
+              <a:bodyPr wrap="none" rtlCol="0">
+                <a:spAutoFit/>
+              </a:bodyPr>
+              <a:lstStyle/>
+              <a:p>
+                <a:r>
+                  <a:rPr lang="nl-NL" sz="1400" dirty="0">
+                    <a:latin typeface="Arial" panose="020B0604020202020204" pitchFamily="34" charset="0"/>
+                    <a:cs typeface="Arial" panose="020B0604020202020204" pitchFamily="34" charset="0"/>
+                  </a:rPr>
+                  <a:t>10</a:t>
+                </a:r>
+                <a:r>
+                  <a:rPr lang="nl-NL" sz="1400" baseline="30000" dirty="0">
+                    <a:latin typeface="Arial" panose="020B0604020202020204" pitchFamily="34" charset="0"/>
+                    <a:cs typeface="Arial" panose="020B0604020202020204" pitchFamily="34" charset="0"/>
+                  </a:rPr>
+                  <a:t>3</a:t>
+                </a:r>
+              </a:p>
+            </p:txBody>
+          </p:sp>
+          <p:sp>
+            <p:nvSpPr>
+              <p:cNvPr id="33" name="Tekstvak 32">
+                <a:extLst>
+                  <a:ext uri="{FF2B5EF4-FFF2-40B4-BE49-F238E27FC236}">
+                    <a16:creationId xmlns:a16="http://schemas.microsoft.com/office/drawing/2014/main" id="{15AB013D-6654-454E-8F88-B26C4D6F2CED}"/>
+                  </a:ext>
+                </a:extLst>
+              </p:cNvPr>
+              <p:cNvSpPr txBox="1"/>
+              <p:nvPr/>
+            </p:nvSpPr>
+            <p:spPr>
+              <a:xfrm>
+                <a:off x="7725927" y="5996610"/>
+                <a:ext cx="450764" cy="307777"/>
+              </a:xfrm>
+              <a:prstGeom prst="rect">
+                <a:avLst/>
+              </a:prstGeom>
+              <a:noFill/>
+            </p:spPr>
+            <p:txBody>
+              <a:bodyPr wrap="none" rtlCol="0">
+                <a:spAutoFit/>
+              </a:bodyPr>
+              <a:lstStyle/>
+              <a:p>
+                <a:r>
+                  <a:rPr lang="nl-NL" sz="1400" dirty="0">
+                    <a:latin typeface="Arial" panose="020B0604020202020204" pitchFamily="34" charset="0"/>
+                    <a:cs typeface="Arial" panose="020B0604020202020204" pitchFamily="34" charset="0"/>
+                  </a:rPr>
+                  <a:t>10</a:t>
+                </a:r>
+                <a:r>
+                  <a:rPr lang="nl-NL" sz="1400" baseline="30000" dirty="0">
+                    <a:latin typeface="Arial" panose="020B0604020202020204" pitchFamily="34" charset="0"/>
+                    <a:cs typeface="Arial" panose="020B0604020202020204" pitchFamily="34" charset="0"/>
+                  </a:rPr>
+                  <a:t>4</a:t>
+                </a:r>
+              </a:p>
+            </p:txBody>
+          </p:sp>
+          <p:sp>
+            <p:nvSpPr>
+              <p:cNvPr id="34" name="Tekstvak 33">
+                <a:extLst>
+                  <a:ext uri="{FF2B5EF4-FFF2-40B4-BE49-F238E27FC236}">
+                    <a16:creationId xmlns:a16="http://schemas.microsoft.com/office/drawing/2014/main" id="{613F4660-DBC9-468B-969D-720C8817FDA1}"/>
+                  </a:ext>
+                </a:extLst>
+              </p:cNvPr>
+              <p:cNvSpPr txBox="1"/>
+              <p:nvPr/>
+            </p:nvSpPr>
+            <p:spPr>
+              <a:xfrm>
+                <a:off x="8328993" y="5997434"/>
+                <a:ext cx="450764" cy="307777"/>
+              </a:xfrm>
+              <a:prstGeom prst="rect">
+                <a:avLst/>
+              </a:prstGeom>
+              <a:noFill/>
+            </p:spPr>
+            <p:txBody>
+              <a:bodyPr wrap="none" rtlCol="0">
+                <a:spAutoFit/>
+              </a:bodyPr>
+              <a:lstStyle/>
+              <a:p>
+                <a:r>
+                  <a:rPr lang="nl-NL" sz="1400" dirty="0">
+                    <a:latin typeface="Arial" panose="020B0604020202020204" pitchFamily="34" charset="0"/>
+                    <a:cs typeface="Arial" panose="020B0604020202020204" pitchFamily="34" charset="0"/>
+                  </a:rPr>
+                  <a:t>10</a:t>
+                </a:r>
+                <a:r>
+                  <a:rPr lang="nl-NL" sz="1400" baseline="30000" dirty="0">
+                    <a:latin typeface="Arial" panose="020B0604020202020204" pitchFamily="34" charset="0"/>
+                    <a:cs typeface="Arial" panose="020B0604020202020204" pitchFamily="34" charset="0"/>
+                  </a:rPr>
+                  <a:t>5</a:t>
+                </a:r>
+              </a:p>
+            </p:txBody>
+          </p:sp>
+          <p:sp>
+            <p:nvSpPr>
+              <p:cNvPr id="35" name="Tekstvak 34">
+                <a:extLst>
+                  <a:ext uri="{FF2B5EF4-FFF2-40B4-BE49-F238E27FC236}">
+                    <a16:creationId xmlns:a16="http://schemas.microsoft.com/office/drawing/2014/main" id="{0F5BD60B-1D93-4C57-817E-3E4DD6F13C7D}"/>
+                  </a:ext>
+                </a:extLst>
+              </p:cNvPr>
+              <p:cNvSpPr txBox="1"/>
+              <p:nvPr/>
+            </p:nvSpPr>
+            <p:spPr>
+              <a:xfrm>
+                <a:off x="9012243" y="5996610"/>
+                <a:ext cx="450764" cy="307777"/>
+              </a:xfrm>
+              <a:prstGeom prst="rect">
+                <a:avLst/>
+              </a:prstGeom>
+              <a:noFill/>
+            </p:spPr>
+            <p:txBody>
+              <a:bodyPr wrap="none" rtlCol="0">
+                <a:spAutoFit/>
+              </a:bodyPr>
+              <a:lstStyle/>
+              <a:p>
+                <a:r>
+                  <a:rPr lang="nl-NL" sz="1400" dirty="0">
+                    <a:latin typeface="Arial" panose="020B0604020202020204" pitchFamily="34" charset="0"/>
+                    <a:cs typeface="Arial" panose="020B0604020202020204" pitchFamily="34" charset="0"/>
+                  </a:rPr>
+                  <a:t>10</a:t>
+                </a:r>
+                <a:r>
+                  <a:rPr lang="nl-NL" sz="1400" baseline="30000" dirty="0">
+                    <a:latin typeface="Arial" panose="020B0604020202020204" pitchFamily="34" charset="0"/>
+                    <a:cs typeface="Arial" panose="020B0604020202020204" pitchFamily="34" charset="0"/>
+                  </a:rPr>
+                  <a:t>6</a:t>
+                </a:r>
+              </a:p>
+            </p:txBody>
+          </p:sp>
+          <p:pic>
+            <p:nvPicPr>
+              <p:cNvPr id="4" name="Afbeelding 3">
+                <a:extLst>
+                  <a:ext uri="{FF2B5EF4-FFF2-40B4-BE49-F238E27FC236}">
+                    <a16:creationId xmlns:a16="http://schemas.microsoft.com/office/drawing/2014/main" id="{FBAA39DA-2448-4429-BAC7-22F0E2DC1B63}"/>
+                  </a:ext>
+                </a:extLst>
+              </p:cNvPr>
+              <p:cNvPicPr>
+                <a:picLocks noChangeAspect="1"/>
+              </p:cNvPicPr>
+              <p:nvPr/>
+            </p:nvPicPr>
+            <p:blipFill rotWithShape="1">
+              <a:blip r:embed="rId4"/>
+              <a:srcRect t="2026" b="29368"/>
+              <a:stretch/>
+            </p:blipFill>
+            <p:spPr>
+              <a:xfrm>
+                <a:off x="4064403" y="3688295"/>
+                <a:ext cx="5529083" cy="2274617"/>
+              </a:xfrm>
+              <a:prstGeom prst="rect">
+                <a:avLst/>
+              </a:prstGeom>
+            </p:spPr>
+          </p:pic>
+        </p:grpSp>
+        <p:pic>
+          <p:nvPicPr>
+            <p:cNvPr id="1026" name="Picture 2" descr="https://latex.codecogs.com/gif.latex?%5Cdpi%7B300%7D%20%5Clarge%20%5Ctext%7BE%7D%5B%5Ctheta%28t%29%5D%20-%20%5Ctheta%28t%29">
+              <a:extLst>
+                <a:ext uri="{FF2B5EF4-FFF2-40B4-BE49-F238E27FC236}">
+                  <a16:creationId xmlns:a16="http://schemas.microsoft.com/office/drawing/2014/main" id="{28373277-1035-4531-BB5E-8CFFF0A0F968}"/>
+                </a:ext>
+              </a:extLst>
+            </p:cNvPr>
+            <p:cNvPicPr>
+              <a:picLocks noChangeAspect="1" noChangeArrowheads="1"/>
+            </p:cNvPicPr>
+            <p:nvPr/>
+          </p:nvPicPr>
+          <p:blipFill>
+            <a:blip r:embed="rId5">
+              <a:extLst>
+                <a:ext uri="{28A0092B-C50C-407E-A947-70E740481C1C}">
+                  <a14:useLocalDpi xmlns:a14="http://schemas.microsoft.com/office/drawing/2010/main" val="0"/>
+                </a:ext>
+              </a:extLst>
+            </a:blip>
+            <a:srcRect/>
+            <a:stretch>
+              <a:fillRect/>
+            </a:stretch>
+          </p:blipFill>
+          <p:spPr bwMode="auto">
+            <a:xfrm rot="16200000">
+              <a:off x="3384482" y="4255581"/>
+              <a:ext cx="1000459" cy="185495"/>
+            </a:xfrm>
+            <a:prstGeom prst="rect">
+              <a:avLst/>
+            </a:prstGeom>
+            <a:noFill/>
+            <a:extLst>
+              <a:ext uri="{909E8E84-426E-40DD-AFC4-6F175D3DCCD1}">
+                <a14:hiddenFill xmlns:a14="http://schemas.microsoft.com/office/drawing/2010/main">
+                  <a:solidFill>
+                    <a:srgbClr val="FFFFFF"/>
+                  </a:solidFill>
+                </a14:hiddenFill>
+              </a:ext>
+            </a:extLst>
+          </p:spPr>
+        </p:pic>
+        <p:pic>
+          <p:nvPicPr>
+            <p:cNvPr id="1028" name="Picture 4" descr="https://latex.codecogs.com/gif.latex?%5Cdpi%7B300%7D%20%5Clarge%20%5Ctheta%28t%29">
+              <a:extLst>
+                <a:ext uri="{FF2B5EF4-FFF2-40B4-BE49-F238E27FC236}">
+                  <a16:creationId xmlns:a16="http://schemas.microsoft.com/office/drawing/2014/main" id="{8099776B-9D5C-4F35-AEE5-ED2B8FF5FC9E}"/>
+                </a:ext>
+              </a:extLst>
+            </p:cNvPr>
+            <p:cNvPicPr>
+              <a:picLocks noChangeAspect="1" noChangeArrowheads="1"/>
+            </p:cNvPicPr>
+            <p:nvPr/>
+          </p:nvPicPr>
+          <p:blipFill>
+            <a:blip r:embed="rId6">
+              <a:extLst>
+                <a:ext uri="{28A0092B-C50C-407E-A947-70E740481C1C}">
+                  <a14:useLocalDpi xmlns:a14="http://schemas.microsoft.com/office/drawing/2010/main" val="0"/>
+                </a:ext>
+              </a:extLst>
+            </a:blip>
+            <a:srcRect/>
+            <a:stretch>
+              <a:fillRect/>
+            </a:stretch>
+          </p:blipFill>
+          <p:spPr bwMode="auto">
+            <a:xfrm>
+              <a:off x="3734619" y="1895475"/>
+              <a:ext cx="329784" cy="228600"/>
+            </a:xfrm>
+            <a:prstGeom prst="rect">
+              <a:avLst/>
+            </a:prstGeom>
+            <a:noFill/>
+            <a:extLst>
+              <a:ext uri="{909E8E84-426E-40DD-AFC4-6F175D3DCCD1}">
+                <a14:hiddenFill xmlns:a14="http://schemas.microsoft.com/office/drawing/2010/main">
+                  <a:solidFill>
+                    <a:srgbClr val="FFFFFF"/>
+                  </a:solidFill>
+                </a14:hiddenFill>
+              </a:ext>
+            </a:extLst>
+          </p:spPr>
+        </p:pic>
+      </p:grpSp>
+    </p:spTree>
+    <p:extLst>
+      <p:ext uri="{BB962C8B-B14F-4D97-AF65-F5344CB8AC3E}">
+        <p14:creationId xmlns:p14="http://schemas.microsoft.com/office/powerpoint/2010/main" val="3150130966"/>
       </p:ext>
     </p:extLst>
   </p:cSld>

</xml_diff>